<commit_message>
can get bpm correctly
</commit_message>
<xml_diff>
--- a/Presentation/Final Presentation.pptx
+++ b/Presentation/Final Presentation.pptx
@@ -4,12 +4,17 @@
   <p:sldMasterIdLst>
     <p:sldMasterId id="2147483648" r:id="rId1"/>
   </p:sldMasterIdLst>
+  <p:notesMasterIdLst>
+    <p:notesMasterId r:id="rId9"/>
+  </p:notesMasterIdLst>
   <p:sldIdLst>
     <p:sldId id="256" r:id="rId2"/>
     <p:sldId id="261" r:id="rId3"/>
     <p:sldId id="257" r:id="rId4"/>
-    <p:sldId id="260" r:id="rId5"/>
-    <p:sldId id="258" r:id="rId6"/>
+    <p:sldId id="262" r:id="rId5"/>
+    <p:sldId id="263" r:id="rId6"/>
+    <p:sldId id="264" r:id="rId7"/>
+    <p:sldId id="265" r:id="rId8"/>
   </p:sldIdLst>
   <p:sldSz cx="12192000" cy="6858000"/>
   <p:notesSz cx="6858000" cy="9144000"/>
@@ -116,6 +121,439 @@
 </p:presentation>
 </file>
 
+<file path=ppt/notesMasters/notesMaster1.xml><?xml version="1.0" encoding="utf-8"?>
+<p:notesMaster xmlns:a="http://schemas.openxmlformats.org/drawingml/2006/main" xmlns:r="http://schemas.openxmlformats.org/officeDocument/2006/relationships" xmlns:p="http://schemas.openxmlformats.org/presentationml/2006/main">
+  <p:cSld>
+    <p:bg>
+      <p:bgRef idx="1001">
+        <a:schemeClr val="bg1"/>
+      </p:bgRef>
+    </p:bg>
+    <p:spTree>
+      <p:nvGrpSpPr>
+        <p:cNvPr id="1" name=""/>
+        <p:cNvGrpSpPr/>
+        <p:nvPr/>
+      </p:nvGrpSpPr>
+      <p:grpSpPr>
+        <a:xfrm>
+          <a:off x="0" y="0"/>
+          <a:ext cx="0" cy="0"/>
+          <a:chOff x="0" y="0"/>
+          <a:chExt cx="0" cy="0"/>
+        </a:xfrm>
+      </p:grpSpPr>
+      <p:sp>
+        <p:nvSpPr>
+          <p:cNvPr id="2" name="Header Placeholder 1"/>
+          <p:cNvSpPr>
+            <a:spLocks noGrp="1"/>
+          </p:cNvSpPr>
+          <p:nvPr>
+            <p:ph type="hdr" sz="quarter"/>
+          </p:nvPr>
+        </p:nvSpPr>
+        <p:spPr>
+          <a:xfrm>
+            <a:off x="0" y="0"/>
+            <a:ext cx="2971800" cy="458788"/>
+          </a:xfrm>
+          <a:prstGeom prst="rect">
+            <a:avLst/>
+          </a:prstGeom>
+        </p:spPr>
+        <p:txBody>
+          <a:bodyPr vert="horz" lIns="91440" tIns="45720" rIns="91440" bIns="45720" rtlCol="0"/>
+          <a:lstStyle>
+            <a:lvl1pPr algn="l">
+              <a:defRPr sz="1200"/>
+            </a:lvl1pPr>
+          </a:lstStyle>
+          <a:p>
+            <a:endParaRPr lang="en-US"/>
+          </a:p>
+        </p:txBody>
+      </p:sp>
+      <p:sp>
+        <p:nvSpPr>
+          <p:cNvPr id="3" name="Date Placeholder 2"/>
+          <p:cNvSpPr>
+            <a:spLocks noGrp="1"/>
+          </p:cNvSpPr>
+          <p:nvPr>
+            <p:ph type="dt" idx="1"/>
+          </p:nvPr>
+        </p:nvSpPr>
+        <p:spPr>
+          <a:xfrm>
+            <a:off x="3884613" y="0"/>
+            <a:ext cx="2971800" cy="458788"/>
+          </a:xfrm>
+          <a:prstGeom prst="rect">
+            <a:avLst/>
+          </a:prstGeom>
+        </p:spPr>
+        <p:txBody>
+          <a:bodyPr vert="horz" lIns="91440" tIns="45720" rIns="91440" bIns="45720" rtlCol="0"/>
+          <a:lstStyle>
+            <a:lvl1pPr algn="r">
+              <a:defRPr sz="1200"/>
+            </a:lvl1pPr>
+          </a:lstStyle>
+          <a:p>
+            <a:fld id="{65C09901-1E64-4449-A008-99B24705022F}" type="datetimeFigureOut">
+              <a:rPr lang="en-US" smtClean="0"/>
+              <a:t>11/28/24</a:t>
+            </a:fld>
+            <a:endParaRPr lang="en-US"/>
+          </a:p>
+        </p:txBody>
+      </p:sp>
+      <p:sp>
+        <p:nvSpPr>
+          <p:cNvPr id="4" name="Slide Image Placeholder 3"/>
+          <p:cNvSpPr>
+            <a:spLocks noGrp="1" noRot="1" noChangeAspect="1"/>
+          </p:cNvSpPr>
+          <p:nvPr>
+            <p:ph type="sldImg" idx="2"/>
+          </p:nvPr>
+        </p:nvSpPr>
+        <p:spPr>
+          <a:xfrm>
+            <a:off x="685800" y="1143000"/>
+            <a:ext cx="5486400" cy="3086100"/>
+          </a:xfrm>
+          <a:prstGeom prst="rect">
+            <a:avLst/>
+          </a:prstGeom>
+          <a:noFill/>
+          <a:ln w="12700">
+            <a:solidFill>
+              <a:prstClr val="black"/>
+            </a:solidFill>
+          </a:ln>
+        </p:spPr>
+        <p:txBody>
+          <a:bodyPr vert="horz" lIns="91440" tIns="45720" rIns="91440" bIns="45720" rtlCol="0" anchor="ctr"/>
+          <a:lstStyle/>
+          <a:p>
+            <a:endParaRPr lang="en-US"/>
+          </a:p>
+        </p:txBody>
+      </p:sp>
+      <p:sp>
+        <p:nvSpPr>
+          <p:cNvPr id="5" name="Notes Placeholder 4"/>
+          <p:cNvSpPr>
+            <a:spLocks noGrp="1"/>
+          </p:cNvSpPr>
+          <p:nvPr>
+            <p:ph type="body" sz="quarter" idx="3"/>
+          </p:nvPr>
+        </p:nvSpPr>
+        <p:spPr>
+          <a:xfrm>
+            <a:off x="685800" y="4400550"/>
+            <a:ext cx="5486400" cy="3600450"/>
+          </a:xfrm>
+          <a:prstGeom prst="rect">
+            <a:avLst/>
+          </a:prstGeom>
+        </p:spPr>
+        <p:txBody>
+          <a:bodyPr vert="horz" lIns="91440" tIns="45720" rIns="91440" bIns="45720" rtlCol="0"/>
+          <a:lstStyle/>
+          <a:p>
+            <a:pPr lvl="0"/>
+            <a:r>
+              <a:rPr lang="en-US"/>
+              <a:t>Click to edit Master text styles</a:t>
+            </a:r>
+          </a:p>
+          <a:p>
+            <a:pPr lvl="1"/>
+            <a:r>
+              <a:rPr lang="en-US"/>
+              <a:t>Second level</a:t>
+            </a:r>
+          </a:p>
+          <a:p>
+            <a:pPr lvl="2"/>
+            <a:r>
+              <a:rPr lang="en-US"/>
+              <a:t>Third level</a:t>
+            </a:r>
+          </a:p>
+          <a:p>
+            <a:pPr lvl="3"/>
+            <a:r>
+              <a:rPr lang="en-US"/>
+              <a:t>Fourth level</a:t>
+            </a:r>
+          </a:p>
+          <a:p>
+            <a:pPr lvl="4"/>
+            <a:r>
+              <a:rPr lang="en-US"/>
+              <a:t>Fifth level</a:t>
+            </a:r>
+          </a:p>
+        </p:txBody>
+      </p:sp>
+      <p:sp>
+        <p:nvSpPr>
+          <p:cNvPr id="6" name="Footer Placeholder 5"/>
+          <p:cNvSpPr>
+            <a:spLocks noGrp="1"/>
+          </p:cNvSpPr>
+          <p:nvPr>
+            <p:ph type="ftr" sz="quarter" idx="4"/>
+          </p:nvPr>
+        </p:nvSpPr>
+        <p:spPr>
+          <a:xfrm>
+            <a:off x="0" y="8685213"/>
+            <a:ext cx="2971800" cy="458787"/>
+          </a:xfrm>
+          <a:prstGeom prst="rect">
+            <a:avLst/>
+          </a:prstGeom>
+        </p:spPr>
+        <p:txBody>
+          <a:bodyPr vert="horz" lIns="91440" tIns="45720" rIns="91440" bIns="45720" rtlCol="0" anchor="b"/>
+          <a:lstStyle>
+            <a:lvl1pPr algn="l">
+              <a:defRPr sz="1200"/>
+            </a:lvl1pPr>
+          </a:lstStyle>
+          <a:p>
+            <a:endParaRPr lang="en-US"/>
+          </a:p>
+        </p:txBody>
+      </p:sp>
+      <p:sp>
+        <p:nvSpPr>
+          <p:cNvPr id="7" name="Slide Number Placeholder 6"/>
+          <p:cNvSpPr>
+            <a:spLocks noGrp="1"/>
+          </p:cNvSpPr>
+          <p:nvPr>
+            <p:ph type="sldNum" sz="quarter" idx="5"/>
+          </p:nvPr>
+        </p:nvSpPr>
+        <p:spPr>
+          <a:xfrm>
+            <a:off x="3884613" y="8685213"/>
+            <a:ext cx="2971800" cy="458787"/>
+          </a:xfrm>
+          <a:prstGeom prst="rect">
+            <a:avLst/>
+          </a:prstGeom>
+        </p:spPr>
+        <p:txBody>
+          <a:bodyPr vert="horz" lIns="91440" tIns="45720" rIns="91440" bIns="45720" rtlCol="0" anchor="b"/>
+          <a:lstStyle>
+            <a:lvl1pPr algn="r">
+              <a:defRPr sz="1200"/>
+            </a:lvl1pPr>
+          </a:lstStyle>
+          <a:p>
+            <a:fld id="{05C9A2A4-BF26-4449-BCDF-B8CED4D33CBC}" type="slidenum">
+              <a:rPr lang="en-US" smtClean="0"/>
+              <a:t>‹#›</a:t>
+            </a:fld>
+            <a:endParaRPr lang="en-US"/>
+          </a:p>
+        </p:txBody>
+      </p:sp>
+    </p:spTree>
+    <p:extLst>
+      <p:ext uri="{BB962C8B-B14F-4D97-AF65-F5344CB8AC3E}">
+        <p14:creationId xmlns:p14="http://schemas.microsoft.com/office/powerpoint/2010/main" val="1314552650"/>
+      </p:ext>
+    </p:extLst>
+  </p:cSld>
+  <p:clrMap bg1="lt1" tx1="dk1" bg2="lt2" tx2="dk2" accent1="accent1" accent2="accent2" accent3="accent3" accent4="accent4" accent5="accent5" accent6="accent6" hlink="hlink" folHlink="folHlink"/>
+  <p:notesStyle>
+    <a:lvl1pPr marL="0" algn="l" defTabSz="914400" rtl="0" eaLnBrk="1" latinLnBrk="0" hangingPunct="1">
+      <a:defRPr sz="1200" kern="1200">
+        <a:solidFill>
+          <a:schemeClr val="tx1"/>
+        </a:solidFill>
+        <a:latin typeface="+mn-lt"/>
+        <a:ea typeface="+mn-ea"/>
+        <a:cs typeface="+mn-cs"/>
+      </a:defRPr>
+    </a:lvl1pPr>
+    <a:lvl2pPr marL="457200" algn="l" defTabSz="914400" rtl="0" eaLnBrk="1" latinLnBrk="0" hangingPunct="1">
+      <a:defRPr sz="1200" kern="1200">
+        <a:solidFill>
+          <a:schemeClr val="tx1"/>
+        </a:solidFill>
+        <a:latin typeface="+mn-lt"/>
+        <a:ea typeface="+mn-ea"/>
+        <a:cs typeface="+mn-cs"/>
+      </a:defRPr>
+    </a:lvl2pPr>
+    <a:lvl3pPr marL="914400" algn="l" defTabSz="914400" rtl="0" eaLnBrk="1" latinLnBrk="0" hangingPunct="1">
+      <a:defRPr sz="1200" kern="1200">
+        <a:solidFill>
+          <a:schemeClr val="tx1"/>
+        </a:solidFill>
+        <a:latin typeface="+mn-lt"/>
+        <a:ea typeface="+mn-ea"/>
+        <a:cs typeface="+mn-cs"/>
+      </a:defRPr>
+    </a:lvl3pPr>
+    <a:lvl4pPr marL="1371600" algn="l" defTabSz="914400" rtl="0" eaLnBrk="1" latinLnBrk="0" hangingPunct="1">
+      <a:defRPr sz="1200" kern="1200">
+        <a:solidFill>
+          <a:schemeClr val="tx1"/>
+        </a:solidFill>
+        <a:latin typeface="+mn-lt"/>
+        <a:ea typeface="+mn-ea"/>
+        <a:cs typeface="+mn-cs"/>
+      </a:defRPr>
+    </a:lvl4pPr>
+    <a:lvl5pPr marL="1828800" algn="l" defTabSz="914400" rtl="0" eaLnBrk="1" latinLnBrk="0" hangingPunct="1">
+      <a:defRPr sz="1200" kern="1200">
+        <a:solidFill>
+          <a:schemeClr val="tx1"/>
+        </a:solidFill>
+        <a:latin typeface="+mn-lt"/>
+        <a:ea typeface="+mn-ea"/>
+        <a:cs typeface="+mn-cs"/>
+      </a:defRPr>
+    </a:lvl5pPr>
+    <a:lvl6pPr marL="2286000" algn="l" defTabSz="914400" rtl="0" eaLnBrk="1" latinLnBrk="0" hangingPunct="1">
+      <a:defRPr sz="1200" kern="1200">
+        <a:solidFill>
+          <a:schemeClr val="tx1"/>
+        </a:solidFill>
+        <a:latin typeface="+mn-lt"/>
+        <a:ea typeface="+mn-ea"/>
+        <a:cs typeface="+mn-cs"/>
+      </a:defRPr>
+    </a:lvl6pPr>
+    <a:lvl7pPr marL="2743200" algn="l" defTabSz="914400" rtl="0" eaLnBrk="1" latinLnBrk="0" hangingPunct="1">
+      <a:defRPr sz="1200" kern="1200">
+        <a:solidFill>
+          <a:schemeClr val="tx1"/>
+        </a:solidFill>
+        <a:latin typeface="+mn-lt"/>
+        <a:ea typeface="+mn-ea"/>
+        <a:cs typeface="+mn-cs"/>
+      </a:defRPr>
+    </a:lvl7pPr>
+    <a:lvl8pPr marL="3200400" algn="l" defTabSz="914400" rtl="0" eaLnBrk="1" latinLnBrk="0" hangingPunct="1">
+      <a:defRPr sz="1200" kern="1200">
+        <a:solidFill>
+          <a:schemeClr val="tx1"/>
+        </a:solidFill>
+        <a:latin typeface="+mn-lt"/>
+        <a:ea typeface="+mn-ea"/>
+        <a:cs typeface="+mn-cs"/>
+      </a:defRPr>
+    </a:lvl8pPr>
+    <a:lvl9pPr marL="3657600" algn="l" defTabSz="914400" rtl="0" eaLnBrk="1" latinLnBrk="0" hangingPunct="1">
+      <a:defRPr sz="1200" kern="1200">
+        <a:solidFill>
+          <a:schemeClr val="tx1"/>
+        </a:solidFill>
+        <a:latin typeface="+mn-lt"/>
+        <a:ea typeface="+mn-ea"/>
+        <a:cs typeface="+mn-cs"/>
+      </a:defRPr>
+    </a:lvl9pPr>
+  </p:notesStyle>
+</p:notesMaster>
+</file>
+
+<file path=ppt/notesSlides/notesSlide1.xml><?xml version="1.0" encoding="utf-8"?>
+<p:notes xmlns:a="http://schemas.openxmlformats.org/drawingml/2006/main" xmlns:r="http://schemas.openxmlformats.org/officeDocument/2006/relationships" xmlns:p="http://schemas.openxmlformats.org/presentationml/2006/main">
+  <p:cSld>
+    <p:spTree>
+      <p:nvGrpSpPr>
+        <p:cNvPr id="1" name=""/>
+        <p:cNvGrpSpPr/>
+        <p:nvPr/>
+      </p:nvGrpSpPr>
+      <p:grpSpPr>
+        <a:xfrm>
+          <a:off x="0" y="0"/>
+          <a:ext cx="0" cy="0"/>
+          <a:chOff x="0" y="0"/>
+          <a:chExt cx="0" cy="0"/>
+        </a:xfrm>
+      </p:grpSpPr>
+      <p:sp>
+        <p:nvSpPr>
+          <p:cNvPr id="2" name="Slide Image Placeholder 1"/>
+          <p:cNvSpPr>
+            <a:spLocks noGrp="1" noRot="1" noChangeAspect="1"/>
+          </p:cNvSpPr>
+          <p:nvPr>
+            <p:ph type="sldImg"/>
+          </p:nvPr>
+        </p:nvSpPr>
+        <p:spPr/>
+      </p:sp>
+      <p:sp>
+        <p:nvSpPr>
+          <p:cNvPr id="3" name="Notes Placeholder 2"/>
+          <p:cNvSpPr>
+            <a:spLocks noGrp="1"/>
+          </p:cNvSpPr>
+          <p:nvPr>
+            <p:ph type="body" idx="1"/>
+          </p:nvPr>
+        </p:nvSpPr>
+        <p:spPr/>
+        <p:txBody>
+          <a:bodyPr/>
+          <a:lstStyle/>
+          <a:p>
+            <a:endParaRPr lang="en-US" dirty="0"/>
+          </a:p>
+        </p:txBody>
+      </p:sp>
+      <p:sp>
+        <p:nvSpPr>
+          <p:cNvPr id="4" name="Slide Number Placeholder 3"/>
+          <p:cNvSpPr>
+            <a:spLocks noGrp="1"/>
+          </p:cNvSpPr>
+          <p:nvPr>
+            <p:ph type="sldNum" sz="quarter" idx="5"/>
+          </p:nvPr>
+        </p:nvSpPr>
+        <p:spPr/>
+        <p:txBody>
+          <a:bodyPr/>
+          <a:lstStyle/>
+          <a:p>
+            <a:fld id="{05C9A2A4-BF26-4449-BCDF-B8CED4D33CBC}" type="slidenum">
+              <a:rPr lang="en-US" smtClean="0"/>
+              <a:t>2</a:t>
+            </a:fld>
+            <a:endParaRPr lang="en-US"/>
+          </a:p>
+        </p:txBody>
+      </p:sp>
+    </p:spTree>
+    <p:extLst>
+      <p:ext uri="{BB962C8B-B14F-4D97-AF65-F5344CB8AC3E}">
+        <p14:creationId xmlns:p14="http://schemas.microsoft.com/office/powerpoint/2010/main" val="362631100"/>
+      </p:ext>
+    </p:extLst>
+  </p:cSld>
+  <p:clrMapOvr>
+    <a:masterClrMapping/>
+  </p:clrMapOvr>
+</p:notes>
+</file>
+
 <file path=ppt/slideLayouts/slideLayout1.xml><?xml version="1.0" encoding="utf-8"?>
 <p:sldLayout xmlns:a="http://schemas.openxmlformats.org/drawingml/2006/main" xmlns:r="http://schemas.openxmlformats.org/officeDocument/2006/relationships" xmlns:p="http://schemas.openxmlformats.org/presentationml/2006/main" type="title" preserve="1">
   <p:cSld name="Title Slide">
@@ -263,7 +701,7 @@
           <a:p>
             <a:fld id="{5E94D043-5BAB-D142-82E2-E6A93D9C0C90}" type="datetimeFigureOut">
               <a:rPr lang="en-US" smtClean="0"/>
-              <a:t>11/14/24</a:t>
+              <a:t>11/28/24</a:t>
             </a:fld>
             <a:endParaRPr lang="en-US"/>
           </a:p>
@@ -461,7 +899,7 @@
           <a:p>
             <a:fld id="{5E94D043-5BAB-D142-82E2-E6A93D9C0C90}" type="datetimeFigureOut">
               <a:rPr lang="en-US" smtClean="0"/>
-              <a:t>11/14/24</a:t>
+              <a:t>11/28/24</a:t>
             </a:fld>
             <a:endParaRPr lang="en-US"/>
           </a:p>
@@ -669,7 +1107,7 @@
           <a:p>
             <a:fld id="{5E94D043-5BAB-D142-82E2-E6A93D9C0C90}" type="datetimeFigureOut">
               <a:rPr lang="en-US" smtClean="0"/>
-              <a:t>11/14/24</a:t>
+              <a:t>11/28/24</a:t>
             </a:fld>
             <a:endParaRPr lang="en-US"/>
           </a:p>
@@ -867,7 +1305,7 @@
           <a:p>
             <a:fld id="{5E94D043-5BAB-D142-82E2-E6A93D9C0C90}" type="datetimeFigureOut">
               <a:rPr lang="en-US" smtClean="0"/>
-              <a:t>11/14/24</a:t>
+              <a:t>11/28/24</a:t>
             </a:fld>
             <a:endParaRPr lang="en-US"/>
           </a:p>
@@ -1142,7 +1580,7 @@
           <a:p>
             <a:fld id="{5E94D043-5BAB-D142-82E2-E6A93D9C0C90}" type="datetimeFigureOut">
               <a:rPr lang="en-US" smtClean="0"/>
-              <a:t>11/14/24</a:t>
+              <a:t>11/28/24</a:t>
             </a:fld>
             <a:endParaRPr lang="en-US"/>
           </a:p>
@@ -1407,7 +1845,7 @@
           <a:p>
             <a:fld id="{5E94D043-5BAB-D142-82E2-E6A93D9C0C90}" type="datetimeFigureOut">
               <a:rPr lang="en-US" smtClean="0"/>
-              <a:t>11/14/24</a:t>
+              <a:t>11/28/24</a:t>
             </a:fld>
             <a:endParaRPr lang="en-US"/>
           </a:p>
@@ -1819,7 +2257,7 @@
           <a:p>
             <a:fld id="{5E94D043-5BAB-D142-82E2-E6A93D9C0C90}" type="datetimeFigureOut">
               <a:rPr lang="en-US" smtClean="0"/>
-              <a:t>11/14/24</a:t>
+              <a:t>11/28/24</a:t>
             </a:fld>
             <a:endParaRPr lang="en-US"/>
           </a:p>
@@ -1960,7 +2398,7 @@
           <a:p>
             <a:fld id="{5E94D043-5BAB-D142-82E2-E6A93D9C0C90}" type="datetimeFigureOut">
               <a:rPr lang="en-US" smtClean="0"/>
-              <a:t>11/14/24</a:t>
+              <a:t>11/28/24</a:t>
             </a:fld>
             <a:endParaRPr lang="en-US"/>
           </a:p>
@@ -2073,7 +2511,7 @@
           <a:p>
             <a:fld id="{5E94D043-5BAB-D142-82E2-E6A93D9C0C90}" type="datetimeFigureOut">
               <a:rPr lang="en-US" smtClean="0"/>
-              <a:t>11/14/24</a:t>
+              <a:t>11/28/24</a:t>
             </a:fld>
             <a:endParaRPr lang="en-US"/>
           </a:p>
@@ -2384,7 +2822,7 @@
           <a:p>
             <a:fld id="{5E94D043-5BAB-D142-82E2-E6A93D9C0C90}" type="datetimeFigureOut">
               <a:rPr lang="en-US" smtClean="0"/>
-              <a:t>11/14/24</a:t>
+              <a:t>11/28/24</a:t>
             </a:fld>
             <a:endParaRPr lang="en-US"/>
           </a:p>
@@ -2672,7 +3110,7 @@
           <a:p>
             <a:fld id="{5E94D043-5BAB-D142-82E2-E6A93D9C0C90}" type="datetimeFigureOut">
               <a:rPr lang="en-US" smtClean="0"/>
-              <a:t>11/14/24</a:t>
+              <a:t>11/28/24</a:t>
             </a:fld>
             <a:endParaRPr lang="en-US"/>
           </a:p>
@@ -2913,7 +3351,7 @@
           <a:p>
             <a:fld id="{5E94D043-5BAB-D142-82E2-E6A93D9C0C90}" type="datetimeFigureOut">
               <a:rPr lang="en-US" smtClean="0"/>
-              <a:t>11/14/24</a:t>
+              <a:t>11/28/24</a:t>
             </a:fld>
             <a:endParaRPr lang="en-US"/>
           </a:p>
@@ -3344,8 +3782,8 @@
         </p:nvSpPr>
         <p:spPr>
           <a:xfrm>
-            <a:off x="2605413" y="2598003"/>
-            <a:ext cx="9586587" cy="830997"/>
+            <a:off x="1469984" y="2713750"/>
+            <a:ext cx="10722015" cy="830997"/>
           </a:xfrm>
           <a:prstGeom prst="rect">
             <a:avLst/>
@@ -3370,50 +3808,21 @@
           </a:p>
         </p:txBody>
       </p:sp>
-      <p:pic>
-        <p:nvPicPr>
-          <p:cNvPr id="7" name="Picture 6">
-            <a:extLst>
-              <a:ext uri="{FF2B5EF4-FFF2-40B4-BE49-F238E27FC236}">
-                <a16:creationId xmlns:a16="http://schemas.microsoft.com/office/drawing/2014/main" id="{0CAB0EDC-0257-D8D3-1929-6774CF2C77BC}"/>
-              </a:ext>
-            </a:extLst>
-          </p:cNvPr>
-          <p:cNvPicPr>
-            <a:picLocks noChangeAspect="1"/>
-          </p:cNvPicPr>
+      <p:sp>
+        <p:nvSpPr>
+          <p:cNvPr id="9" name="TextBox 8">
+            <a:extLst>
+              <a:ext uri="{FF2B5EF4-FFF2-40B4-BE49-F238E27FC236}">
+                <a16:creationId xmlns:a16="http://schemas.microsoft.com/office/drawing/2014/main" id="{121E6B48-B901-2350-8206-DCBDCA784DA6}"/>
+              </a:ext>
+            </a:extLst>
+          </p:cNvPr>
+          <p:cNvSpPr txBox="1"/>
           <p:nvPr/>
-        </p:nvPicPr>
-        <p:blipFill>
-          <a:blip r:embed="rId2"/>
-          <a:srcRect/>
-          <a:stretch/>
-        </p:blipFill>
+        </p:nvSpPr>
         <p:spPr>
           <a:xfrm>
-            <a:off x="172429" y="148590"/>
-            <a:ext cx="2615795" cy="6560820"/>
-          </a:xfrm>
-          <a:prstGeom prst="rect">
-            <a:avLst/>
-          </a:prstGeom>
-        </p:spPr>
-      </p:pic>
-      <p:sp>
-        <p:nvSpPr>
-          <p:cNvPr id="9" name="TextBox 8">
-            <a:extLst>
-              <a:ext uri="{FF2B5EF4-FFF2-40B4-BE49-F238E27FC236}">
-                <a16:creationId xmlns:a16="http://schemas.microsoft.com/office/drawing/2014/main" id="{121E6B48-B901-2350-8206-DCBDCA784DA6}"/>
-              </a:ext>
-            </a:extLst>
-          </p:cNvPr>
-          <p:cNvSpPr txBox="1"/>
-          <p:nvPr/>
-        </p:nvSpPr>
-        <p:spPr>
-          <a:xfrm>
-            <a:off x="5393636" y="6340078"/>
+            <a:off x="4825921" y="6488668"/>
             <a:ext cx="4010140" cy="369332"/>
           </a:xfrm>
           <a:prstGeom prst="rect">
@@ -3469,7 +3878,7 @@
         </p:nvSpPr>
         <p:spPr>
           <a:xfrm>
-            <a:off x="5393636" y="3407890"/>
+            <a:off x="4825922" y="3429000"/>
             <a:ext cx="4010140" cy="461665"/>
           </a:xfrm>
           <a:prstGeom prst="rect">
@@ -3490,8 +3899,57 @@
                 <a:ea typeface="Apple Symbols" panose="02000000000000000000" pitchFamily="2" charset="-79"/>
                 <a:cs typeface="Apple Symbols" panose="02000000000000000000" pitchFamily="2" charset="-79"/>
               </a:rPr>
-              <a:t> ~ Progress Update ~</a:t>
-            </a:r>
+              <a:t>Project Presentation</a:t>
+            </a:r>
+          </a:p>
+        </p:txBody>
+      </p:sp>
+      <p:sp>
+        <p:nvSpPr>
+          <p:cNvPr id="3" name="Rectangle 2">
+            <a:extLst>
+              <a:ext uri="{FF2B5EF4-FFF2-40B4-BE49-F238E27FC236}">
+                <a16:creationId xmlns:a16="http://schemas.microsoft.com/office/drawing/2014/main" id="{A327C9DB-7505-9C1A-6EFE-E300480D77D0}"/>
+              </a:ext>
+            </a:extLst>
+          </p:cNvPr>
+          <p:cNvSpPr/>
+          <p:nvPr/>
+        </p:nvSpPr>
+        <p:spPr>
+          <a:xfrm>
+            <a:off x="0" y="0"/>
+            <a:ext cx="1469985" cy="6858000"/>
+          </a:xfrm>
+          <a:prstGeom prst="rect">
+            <a:avLst/>
+          </a:prstGeom>
+          <a:ln>
+            <a:noFill/>
+          </a:ln>
+        </p:spPr>
+        <p:style>
+          <a:lnRef idx="2">
+            <a:schemeClr val="accent1">
+              <a:shade val="15000"/>
+            </a:schemeClr>
+          </a:lnRef>
+          <a:fillRef idx="1">
+            <a:schemeClr val="accent1"/>
+          </a:fillRef>
+          <a:effectRef idx="0">
+            <a:schemeClr val="accent1"/>
+          </a:effectRef>
+          <a:fontRef idx="minor">
+            <a:schemeClr val="lt1"/>
+          </a:fontRef>
+        </p:style>
+        <p:txBody>
+          <a:bodyPr rtlCol="0" anchor="ctr"/>
+          <a:lstStyle/>
+          <a:p>
+            <a:pPr algn="ctr"/>
+            <a:endParaRPr lang="en-US"/>
           </a:p>
         </p:txBody>
       </p:sp>
@@ -3505,13 +3963,13 @@
   <p:clrMapOvr>
     <a:masterClrMapping/>
   </p:clrMapOvr>
-  <mc:AlternateContent xmlns:mc="http://schemas.openxmlformats.org/markup-compatibility/2006">
-    <mc:Choice xmlns:p14="http://schemas.microsoft.com/office/powerpoint/2010/main" Requires="p14">
+  <mc:AlternateContent xmlns:mc="http://schemas.openxmlformats.org/markup-compatibility/2006" xmlns:p14="http://schemas.microsoft.com/office/powerpoint/2010/main">
+    <mc:Choice Requires="p14">
       <p:transition p14:dur="100">
         <p:fade/>
       </p:transition>
     </mc:Choice>
-    <mc:Fallback>
+    <mc:Fallback xmlns="">
       <p:transition>
         <p:fade/>
       </p:transition>
@@ -3537,41 +3995,12 @@
           <a:chExt cx="0" cy="0"/>
         </a:xfrm>
       </p:grpSpPr>
-      <p:pic>
-        <p:nvPicPr>
-          <p:cNvPr id="4" name="Picture 3">
-            <a:extLst>
-              <a:ext uri="{FF2B5EF4-FFF2-40B4-BE49-F238E27FC236}">
-                <a16:creationId xmlns:a16="http://schemas.microsoft.com/office/drawing/2014/main" id="{86054D79-6BEE-F14C-B2E6-E5C98FA1BE8A}"/>
-              </a:ext>
-            </a:extLst>
-          </p:cNvPr>
-          <p:cNvPicPr>
-            <a:picLocks noChangeAspect="1"/>
-          </p:cNvPicPr>
-          <p:nvPr/>
-        </p:nvPicPr>
-        <p:blipFill>
-          <a:blip r:embed="rId2"/>
-          <a:srcRect/>
-          <a:stretch/>
-        </p:blipFill>
-        <p:spPr>
-          <a:xfrm rot="16200000">
-            <a:off x="5214814" y="-46300"/>
-            <a:ext cx="1749121" cy="11648660"/>
-          </a:xfrm>
-          <a:prstGeom prst="rect">
-            <a:avLst/>
-          </a:prstGeom>
-        </p:spPr>
-      </p:pic>
-      <p:sp>
-        <p:nvSpPr>
-          <p:cNvPr id="5" name="TextBox 4">
-            <a:extLst>
-              <a:ext uri="{FF2B5EF4-FFF2-40B4-BE49-F238E27FC236}">
-                <a16:creationId xmlns:a16="http://schemas.microsoft.com/office/drawing/2014/main" id="{E362E473-8910-1359-9883-C5034448E005}"/>
+      <p:sp>
+        <p:nvSpPr>
+          <p:cNvPr id="7" name="TextBox 6">
+            <a:extLst>
+              <a:ext uri="{FF2B5EF4-FFF2-40B4-BE49-F238E27FC236}">
+                <a16:creationId xmlns:a16="http://schemas.microsoft.com/office/drawing/2014/main" id="{D53573F8-99D9-5819-4E4A-4C4018F43BCF}"/>
               </a:ext>
             </a:extLst>
           </p:cNvPr>
@@ -3580,49 +4009,8 @@
         </p:nvSpPr>
         <p:spPr>
           <a:xfrm>
-            <a:off x="288101" y="292555"/>
-            <a:ext cx="4386769" cy="461665"/>
-          </a:xfrm>
-          <a:prstGeom prst="rect">
-            <a:avLst/>
-          </a:prstGeom>
-          <a:solidFill>
-            <a:schemeClr val="bg1"/>
-          </a:solidFill>
-        </p:spPr>
-        <p:txBody>
-          <a:bodyPr wrap="square" rtlCol="0">
-            <a:spAutoFit/>
-          </a:bodyPr>
-          <a:lstStyle/>
-          <a:p>
-            <a:r>
-              <a:rPr lang="en-US" sz="2400" b="1" dirty="0">
-                <a:latin typeface="Apple Symbols" panose="02000000000000000000" pitchFamily="2" charset="-79"/>
-                <a:ea typeface="Apple Symbols" panose="02000000000000000000" pitchFamily="2" charset="-79"/>
-                <a:cs typeface="Apple Symbols" panose="02000000000000000000" pitchFamily="2" charset="-79"/>
-              </a:rPr>
-              <a:t>Project Idea and Changes in the plan</a:t>
-            </a:r>
-          </a:p>
-        </p:txBody>
-      </p:sp>
-      <p:sp>
-        <p:nvSpPr>
-          <p:cNvPr id="6" name="TextBox 5">
-            <a:extLst>
-              <a:ext uri="{FF2B5EF4-FFF2-40B4-BE49-F238E27FC236}">
-                <a16:creationId xmlns:a16="http://schemas.microsoft.com/office/drawing/2014/main" id="{715D8681-27C9-1060-F4DC-A3FB453B92FC}"/>
-              </a:ext>
-            </a:extLst>
-          </p:cNvPr>
-          <p:cNvSpPr txBox="1"/>
-          <p:nvPr/>
-        </p:nvSpPr>
-        <p:spPr>
-          <a:xfrm>
-            <a:off x="318777" y="1081469"/>
-            <a:ext cx="11594928" cy="1569660"/>
+            <a:off x="265044" y="205409"/>
+            <a:ext cx="11594928" cy="523220"/>
           </a:xfrm>
           <a:prstGeom prst="rect">
             <a:avLst/>
@@ -3636,136 +4024,62 @@
           <a:lstStyle/>
           <a:p>
             <a:r>
-              <a:rPr lang="en-US" sz="2400" b="1" dirty="0">
+              <a:rPr lang="en-US" sz="2800" b="1" dirty="0">
                 <a:latin typeface="Apple Symbols" panose="02000000000000000000" pitchFamily="2" charset="-79"/>
                 <a:ea typeface="Apple Symbols" panose="02000000000000000000" pitchFamily="2" charset="-79"/>
                 <a:cs typeface="Apple Symbols" panose="02000000000000000000" pitchFamily="2" charset="-79"/>
               </a:rPr>
-              <a:t>Project Idea</a:t>
-            </a:r>
-          </a:p>
-          <a:p>
-            <a:pPr marL="342900" indent="-342900">
-              <a:buFontTx/>
-              <a:buChar char="-"/>
-            </a:pPr>
-            <a:r>
-              <a:rPr lang="en-US" sz="2400" b="1" dirty="0">
-                <a:latin typeface="Apple Symbols" panose="02000000000000000000" pitchFamily="2" charset="-79"/>
-                <a:ea typeface="Apple Symbols" panose="02000000000000000000" pitchFamily="2" charset="-79"/>
-                <a:cs typeface="Apple Symbols" panose="02000000000000000000" pitchFamily="2" charset="-79"/>
-              </a:rPr>
-              <a:t>Control the tempo of a midi accompaniment</a:t>
-            </a:r>
-          </a:p>
-          <a:p>
-            <a:pPr marL="342900" indent="-342900">
-              <a:buFontTx/>
-              <a:buChar char="-"/>
-            </a:pPr>
-            <a:r>
-              <a:rPr lang="en-US" sz="2400" b="1" dirty="0">
-                <a:latin typeface="Apple Symbols" panose="02000000000000000000" pitchFamily="2" charset="-79"/>
-                <a:ea typeface="Apple Symbols" panose="02000000000000000000" pitchFamily="2" charset="-79"/>
-                <a:cs typeface="Apple Symbols" panose="02000000000000000000" pitchFamily="2" charset="-79"/>
-              </a:rPr>
-              <a:t>Two pedals, one for triggering the control, the other for setting the tempo</a:t>
-            </a:r>
-          </a:p>
-          <a:p>
-            <a:endParaRPr lang="en-US" sz="2400" b="1" dirty="0">
-              <a:latin typeface="Apple Symbols" panose="02000000000000000000" pitchFamily="2" charset="-79"/>
-              <a:ea typeface="Apple Symbols" panose="02000000000000000000" pitchFamily="2" charset="-79"/>
-              <a:cs typeface="Apple Symbols" panose="02000000000000000000" pitchFamily="2" charset="-79"/>
-            </a:endParaRPr>
-          </a:p>
-        </p:txBody>
-      </p:sp>
-      <p:sp>
-        <p:nvSpPr>
-          <p:cNvPr id="7" name="TextBox 6">
-            <a:extLst>
-              <a:ext uri="{FF2B5EF4-FFF2-40B4-BE49-F238E27FC236}">
-                <a16:creationId xmlns:a16="http://schemas.microsoft.com/office/drawing/2014/main" id="{D53573F8-99D9-5819-4E4A-4C4018F43BCF}"/>
-              </a:ext>
-            </a:extLst>
-          </p:cNvPr>
-          <p:cNvSpPr txBox="1"/>
+              <a:t>Idea and Motivation</a:t>
+            </a:r>
+          </a:p>
+        </p:txBody>
+      </p:sp>
+      <p:sp>
+        <p:nvSpPr>
+          <p:cNvPr id="2" name="Rectangle 1">
+            <a:extLst>
+              <a:ext uri="{FF2B5EF4-FFF2-40B4-BE49-F238E27FC236}">
+                <a16:creationId xmlns:a16="http://schemas.microsoft.com/office/drawing/2014/main" id="{D2B50462-C7C6-BE0B-8C19-75FA5C218BA4}"/>
+              </a:ext>
+            </a:extLst>
+          </p:cNvPr>
+          <p:cNvSpPr/>
           <p:nvPr/>
         </p:nvSpPr>
         <p:spPr>
-          <a:xfrm>
-            <a:off x="318777" y="2680567"/>
-            <a:ext cx="11594928" cy="2308324"/>
+          <a:xfrm rot="16200000">
+            <a:off x="5361008" y="27007"/>
+            <a:ext cx="1469985" cy="12192001"/>
           </a:xfrm>
           <a:prstGeom prst="rect">
             <a:avLst/>
           </a:prstGeom>
-          <a:noFill/>
+          <a:ln>
+            <a:noFill/>
+          </a:ln>
         </p:spPr>
-        <p:txBody>
-          <a:bodyPr wrap="square" lIns="90000" rtlCol="0">
-            <a:spAutoFit/>
-          </a:bodyPr>
-          <a:lstStyle/>
-          <a:p>
-            <a:r>
-              <a:rPr lang="en-US" sz="2400" b="1" dirty="0">
-                <a:latin typeface="Apple Symbols" panose="02000000000000000000" pitchFamily="2" charset="-79"/>
-                <a:ea typeface="Apple Symbols" panose="02000000000000000000" pitchFamily="2" charset="-79"/>
-                <a:cs typeface="Apple Symbols" panose="02000000000000000000" pitchFamily="2" charset="-79"/>
-              </a:rPr>
-              <a:t>Changes in the plan</a:t>
-            </a:r>
-          </a:p>
-          <a:p>
-            <a:pPr marL="342900" indent="-342900">
-              <a:buFontTx/>
-              <a:buChar char="-"/>
-            </a:pPr>
-            <a:r>
-              <a:rPr lang="en-US" sz="2400" b="1" dirty="0">
-                <a:latin typeface="Apple Symbols" panose="02000000000000000000" pitchFamily="2" charset="-79"/>
-                <a:ea typeface="Apple Symbols" panose="02000000000000000000" pitchFamily="2" charset="-79"/>
-                <a:cs typeface="Apple Symbols" panose="02000000000000000000" pitchFamily="2" charset="-79"/>
-              </a:rPr>
-              <a:t>Changed from an Arduino based circuit to Teensy for better sampling rate and comprehensive MIDI capabilities</a:t>
-            </a:r>
-          </a:p>
-          <a:p>
-            <a:pPr marL="342900" indent="-342900">
-              <a:buFontTx/>
-              <a:buChar char="-"/>
-            </a:pPr>
-            <a:r>
-              <a:rPr lang="en-US" sz="2400" b="1" dirty="0">
-                <a:latin typeface="Apple Symbols" panose="02000000000000000000" pitchFamily="2" charset="-79"/>
-                <a:ea typeface="Apple Symbols" panose="02000000000000000000" pitchFamily="2" charset="-79"/>
-                <a:cs typeface="Apple Symbols" panose="02000000000000000000" pitchFamily="2" charset="-79"/>
-              </a:rPr>
-              <a:t>Added a Rotary Switch to control the power on/off and mode switching</a:t>
-            </a:r>
-          </a:p>
-          <a:p>
-            <a:pPr marL="342900" indent="-342900">
-              <a:buFontTx/>
-              <a:buChar char="-"/>
-            </a:pPr>
-            <a:r>
-              <a:rPr lang="en-US" sz="2400" b="1" dirty="0">
-                <a:latin typeface="Apple Symbols" panose="02000000000000000000" pitchFamily="2" charset="-79"/>
-                <a:ea typeface="Apple Symbols" panose="02000000000000000000" pitchFamily="2" charset="-79"/>
-                <a:cs typeface="Apple Symbols" panose="02000000000000000000" pitchFamily="2" charset="-79"/>
-              </a:rPr>
-              <a:t>Added USB-C controlling for the Teensy, as micro-USB is inconvenient</a:t>
-            </a:r>
-          </a:p>
-          <a:p>
-            <a:endParaRPr lang="en-US" sz="2400" b="1" dirty="0">
-              <a:latin typeface="Apple Symbols" panose="02000000000000000000" pitchFamily="2" charset="-79"/>
-              <a:ea typeface="Apple Symbols" panose="02000000000000000000" pitchFamily="2" charset="-79"/>
-              <a:cs typeface="Apple Symbols" panose="02000000000000000000" pitchFamily="2" charset="-79"/>
-            </a:endParaRPr>
+        <p:style>
+          <a:lnRef idx="2">
+            <a:schemeClr val="accent1">
+              <a:shade val="15000"/>
+            </a:schemeClr>
+          </a:lnRef>
+          <a:fillRef idx="1">
+            <a:schemeClr val="accent1"/>
+          </a:fillRef>
+          <a:effectRef idx="0">
+            <a:schemeClr val="accent1"/>
+          </a:effectRef>
+          <a:fontRef idx="minor">
+            <a:schemeClr val="lt1"/>
+          </a:fontRef>
+        </p:style>
+        <p:txBody>
+          <a:bodyPr rtlCol="0" anchor="ctr"/>
+          <a:lstStyle/>
+          <a:p>
+            <a:pPr algn="ctr"/>
+            <a:endParaRPr lang="en-US"/>
           </a:p>
         </p:txBody>
       </p:sp>
@@ -3779,13 +4093,13 @@
   <p:clrMapOvr>
     <a:masterClrMapping/>
   </p:clrMapOvr>
-  <mc:AlternateContent xmlns:mc="http://schemas.openxmlformats.org/markup-compatibility/2006">
-    <mc:Choice xmlns:p14="http://schemas.microsoft.com/office/powerpoint/2010/main" Requires="p14">
+  <mc:AlternateContent xmlns:mc="http://schemas.openxmlformats.org/markup-compatibility/2006" xmlns:p14="http://schemas.microsoft.com/office/powerpoint/2010/main">
+    <mc:Choice Requires="p14">
       <p:transition p14:dur="70">
         <p:fade/>
       </p:transition>
     </mc:Choice>
-    <mc:Fallback>
+    <mc:Fallback xmlns="">
       <p:transition>
         <p:fade/>
       </p:transition>
@@ -3813,10 +4127,59 @@
       </p:grpSpPr>
       <p:sp>
         <p:nvSpPr>
-          <p:cNvPr id="5" name="TextBox 4">
-            <a:extLst>
-              <a:ext uri="{FF2B5EF4-FFF2-40B4-BE49-F238E27FC236}">
-                <a16:creationId xmlns:a16="http://schemas.microsoft.com/office/drawing/2014/main" id="{77355C95-6F48-2E5D-2A45-F59ED044D7E7}"/>
+          <p:cNvPr id="6" name="Rectangle 5">
+            <a:extLst>
+              <a:ext uri="{FF2B5EF4-FFF2-40B4-BE49-F238E27FC236}">
+                <a16:creationId xmlns:a16="http://schemas.microsoft.com/office/drawing/2014/main" id="{51D32510-24D8-D5E2-46F5-AC98985DCA54}"/>
+              </a:ext>
+            </a:extLst>
+          </p:cNvPr>
+          <p:cNvSpPr/>
+          <p:nvPr/>
+        </p:nvSpPr>
+        <p:spPr>
+          <a:xfrm>
+            <a:off x="10722015" y="0"/>
+            <a:ext cx="1469985" cy="6858000"/>
+          </a:xfrm>
+          <a:prstGeom prst="rect">
+            <a:avLst/>
+          </a:prstGeom>
+          <a:ln>
+            <a:noFill/>
+          </a:ln>
+        </p:spPr>
+        <p:style>
+          <a:lnRef idx="2">
+            <a:schemeClr val="accent1">
+              <a:shade val="15000"/>
+            </a:schemeClr>
+          </a:lnRef>
+          <a:fillRef idx="1">
+            <a:schemeClr val="accent1"/>
+          </a:fillRef>
+          <a:effectRef idx="0">
+            <a:schemeClr val="accent1"/>
+          </a:effectRef>
+          <a:fontRef idx="minor">
+            <a:schemeClr val="lt1"/>
+          </a:fontRef>
+        </p:style>
+        <p:txBody>
+          <a:bodyPr rtlCol="0" anchor="ctr"/>
+          <a:lstStyle/>
+          <a:p>
+            <a:pPr algn="ctr"/>
+            <a:endParaRPr lang="en-US"/>
+          </a:p>
+        </p:txBody>
+      </p:sp>
+      <p:sp>
+        <p:nvSpPr>
+          <p:cNvPr id="7" name="TextBox 6">
+            <a:extLst>
+              <a:ext uri="{FF2B5EF4-FFF2-40B4-BE49-F238E27FC236}">
+                <a16:creationId xmlns:a16="http://schemas.microsoft.com/office/drawing/2014/main" id="{DA05C404-0325-D3CC-888F-B07480385B17}"/>
               </a:ext>
             </a:extLst>
           </p:cNvPr>
@@ -3825,8 +4188,8 @@
         </p:nvSpPr>
         <p:spPr>
           <a:xfrm>
-            <a:off x="298536" y="1351508"/>
-            <a:ext cx="11594928" cy="4524315"/>
+            <a:off x="265044" y="205409"/>
+            <a:ext cx="11594928" cy="523220"/>
           </a:xfrm>
           <a:prstGeom prst="rect">
             <a:avLst/>
@@ -3840,199 +4203,22 @@
           <a:lstStyle/>
           <a:p>
             <a:r>
-              <a:rPr lang="en-US" sz="2400" b="1" dirty="0">
+              <a:rPr lang="en-US" sz="2800" b="1" dirty="0">
                 <a:latin typeface="Apple Symbols" panose="02000000000000000000" pitchFamily="2" charset="-79"/>
                 <a:ea typeface="Apple Symbols" panose="02000000000000000000" pitchFamily="2" charset="-79"/>
                 <a:cs typeface="Apple Symbols" panose="02000000000000000000" pitchFamily="2" charset="-79"/>
               </a:rPr>
-              <a:t>What is done:</a:t>
-            </a:r>
-          </a:p>
-          <a:p>
-            <a:pPr marL="342900" indent="-342900">
-              <a:buFontTx/>
-              <a:buChar char="-"/>
-            </a:pPr>
-            <a:r>
-              <a:rPr lang="en-US" sz="2400" b="1" dirty="0">
-                <a:latin typeface="Apple Symbols" panose="02000000000000000000" pitchFamily="2" charset="-79"/>
-                <a:ea typeface="Apple Symbols" panose="02000000000000000000" pitchFamily="2" charset="-79"/>
-                <a:cs typeface="Apple Symbols" panose="02000000000000000000" pitchFamily="2" charset="-79"/>
-              </a:rPr>
-              <a:t>Prototype circuit implementation</a:t>
-            </a:r>
-          </a:p>
-          <a:p>
-            <a:pPr marL="342900" indent="-342900">
-              <a:buFontTx/>
-              <a:buChar char="-"/>
-            </a:pPr>
-            <a:r>
-              <a:rPr lang="en-US" sz="2400" b="1" dirty="0">
-                <a:latin typeface="Apple Symbols" panose="02000000000000000000" pitchFamily="2" charset="-79"/>
-                <a:ea typeface="Apple Symbols" panose="02000000000000000000" pitchFamily="2" charset="-79"/>
-                <a:cs typeface="Apple Symbols" panose="02000000000000000000" pitchFamily="2" charset="-79"/>
-              </a:rPr>
-              <a:t>Teensy familiarization</a:t>
-            </a:r>
-          </a:p>
-          <a:p>
-            <a:pPr marL="342900" indent="-342900">
-              <a:buFontTx/>
-              <a:buChar char="-"/>
-            </a:pPr>
-            <a:r>
-              <a:rPr lang="en-US" sz="2400" b="1" dirty="0">
-                <a:latin typeface="Apple Symbols" panose="02000000000000000000" pitchFamily="2" charset="-79"/>
-                <a:ea typeface="Apple Symbols" panose="02000000000000000000" pitchFamily="2" charset="-79"/>
-                <a:cs typeface="Apple Symbols" panose="02000000000000000000" pitchFamily="2" charset="-79"/>
-              </a:rPr>
-              <a:t>Full Circuit connected and all signals being read</a:t>
-            </a:r>
-          </a:p>
-          <a:p>
-            <a:pPr marL="342900" indent="-342900">
-              <a:buFontTx/>
-              <a:buChar char="-"/>
-            </a:pPr>
-            <a:r>
-              <a:rPr lang="en-US" sz="2400" b="1" dirty="0">
-                <a:latin typeface="Apple Symbols" panose="02000000000000000000" pitchFamily="2" charset="-79"/>
-                <a:ea typeface="Apple Symbols" panose="02000000000000000000" pitchFamily="2" charset="-79"/>
-                <a:cs typeface="Apple Symbols" panose="02000000000000000000" pitchFamily="2" charset="-79"/>
-              </a:rPr>
-              <a:t>Controlling the tempo of a midi accompaniment</a:t>
-            </a:r>
-          </a:p>
-          <a:p>
-            <a:endParaRPr lang="en-US" sz="2400" b="1" dirty="0">
-              <a:latin typeface="Apple Symbols" panose="02000000000000000000" pitchFamily="2" charset="-79"/>
-              <a:ea typeface="Apple Symbols" panose="02000000000000000000" pitchFamily="2" charset="-79"/>
-              <a:cs typeface="Apple Symbols" panose="02000000000000000000" pitchFamily="2" charset="-79"/>
-            </a:endParaRPr>
-          </a:p>
-          <a:p>
-            <a:endParaRPr lang="en-US" sz="2400" b="1" dirty="0">
-              <a:latin typeface="Apple Symbols" panose="02000000000000000000" pitchFamily="2" charset="-79"/>
-              <a:ea typeface="Apple Symbols" panose="02000000000000000000" pitchFamily="2" charset="-79"/>
-              <a:cs typeface="Apple Symbols" panose="02000000000000000000" pitchFamily="2" charset="-79"/>
-            </a:endParaRPr>
-          </a:p>
-          <a:p>
-            <a:r>
-              <a:rPr lang="en-US" sz="2400" b="1" dirty="0">
-                <a:latin typeface="Apple Symbols" panose="02000000000000000000" pitchFamily="2" charset="-79"/>
-                <a:ea typeface="Apple Symbols" panose="02000000000000000000" pitchFamily="2" charset="-79"/>
-                <a:cs typeface="Apple Symbols" panose="02000000000000000000" pitchFamily="2" charset="-79"/>
-              </a:rPr>
-              <a:t>What is left:</a:t>
-            </a:r>
-          </a:p>
-          <a:p>
-            <a:pPr marL="342900" indent="-342900">
-              <a:buFontTx/>
-              <a:buChar char="-"/>
-            </a:pPr>
-            <a:r>
-              <a:rPr lang="en-US" sz="2400" b="1" dirty="0">
-                <a:latin typeface="Apple Symbols" panose="02000000000000000000" pitchFamily="2" charset="-79"/>
-                <a:ea typeface="Apple Symbols" panose="02000000000000000000" pitchFamily="2" charset="-79"/>
-                <a:cs typeface="Apple Symbols" panose="02000000000000000000" pitchFamily="2" charset="-79"/>
-              </a:rPr>
-              <a:t>Finish the software implementation to control the tempo more intuitively </a:t>
-            </a:r>
-          </a:p>
-          <a:p>
-            <a:pPr marL="342900" indent="-342900">
-              <a:buFontTx/>
-              <a:buChar char="-"/>
-            </a:pPr>
-            <a:r>
-              <a:rPr lang="en-US" sz="2400" b="1" dirty="0">
-                <a:latin typeface="Apple Symbols" panose="02000000000000000000" pitchFamily="2" charset="-79"/>
-                <a:ea typeface="Apple Symbols" panose="02000000000000000000" pitchFamily="2" charset="-79"/>
-                <a:cs typeface="Apple Symbols" panose="02000000000000000000" pitchFamily="2" charset="-79"/>
-              </a:rPr>
-              <a:t>Soldering</a:t>
-            </a:r>
-          </a:p>
-          <a:p>
-            <a:pPr marL="342900" indent="-342900">
-              <a:buFontTx/>
-              <a:buChar char="-"/>
-            </a:pPr>
-            <a:r>
-              <a:rPr lang="en-US" sz="2400" b="1" dirty="0">
-                <a:latin typeface="Apple Symbols" panose="02000000000000000000" pitchFamily="2" charset="-79"/>
-                <a:ea typeface="Apple Symbols" panose="02000000000000000000" pitchFamily="2" charset="-79"/>
-                <a:cs typeface="Apple Symbols" panose="02000000000000000000" pitchFamily="2" charset="-79"/>
-              </a:rPr>
-              <a:t>Finish the box of the pedal and test</a:t>
-            </a:r>
-          </a:p>
-          <a:p>
-            <a:pPr marL="342900" indent="-342900">
-              <a:buFontTx/>
-              <a:buChar char="-"/>
-            </a:pPr>
-            <a:r>
-              <a:rPr lang="en-US" sz="2400" b="1" dirty="0">
-                <a:latin typeface="Apple Symbols" panose="02000000000000000000" pitchFamily="2" charset="-79"/>
-                <a:ea typeface="Apple Symbols" panose="02000000000000000000" pitchFamily="2" charset="-79"/>
-                <a:cs typeface="Apple Symbols" panose="02000000000000000000" pitchFamily="2" charset="-79"/>
-              </a:rPr>
-              <a:t>Finalize Report and Presentation</a:t>
-            </a:r>
-          </a:p>
-        </p:txBody>
-      </p:sp>
-      <p:sp>
-        <p:nvSpPr>
-          <p:cNvPr id="3" name="TextBox 2">
-            <a:extLst>
-              <a:ext uri="{FF2B5EF4-FFF2-40B4-BE49-F238E27FC236}">
-                <a16:creationId xmlns:a16="http://schemas.microsoft.com/office/drawing/2014/main" id="{B6B65812-C748-6C65-2921-3BE3D3924C2C}"/>
-              </a:ext>
-            </a:extLst>
-          </p:cNvPr>
-          <p:cNvSpPr txBox="1"/>
-          <p:nvPr/>
-        </p:nvSpPr>
-        <p:spPr>
-          <a:xfrm>
-            <a:off x="288101" y="292555"/>
-            <a:ext cx="3175189" cy="461665"/>
-          </a:xfrm>
-          <a:prstGeom prst="rect">
-            <a:avLst/>
-          </a:prstGeom>
-          <a:solidFill>
-            <a:schemeClr val="bg1"/>
-          </a:solidFill>
-        </p:spPr>
-        <p:txBody>
-          <a:bodyPr wrap="square" rtlCol="0">
-            <a:spAutoFit/>
-          </a:bodyPr>
-          <a:lstStyle/>
-          <a:p>
-            <a:r>
-              <a:rPr lang="en-US" sz="2400" b="1" dirty="0">
-                <a:latin typeface="Apple Symbols" panose="02000000000000000000" pitchFamily="2" charset="-79"/>
-                <a:ea typeface="Apple Symbols" panose="02000000000000000000" pitchFamily="2" charset="-79"/>
-                <a:cs typeface="Apple Symbols" panose="02000000000000000000" pitchFamily="2" charset="-79"/>
-              </a:rPr>
-              <a:t>What is done, what is left</a:t>
+              <a:t>Circuitry</a:t>
             </a:r>
           </a:p>
         </p:txBody>
       </p:sp>
       <p:pic>
         <p:nvPicPr>
-          <p:cNvPr id="4" name="Picture 3">
-            <a:extLst>
-              <a:ext uri="{FF2B5EF4-FFF2-40B4-BE49-F238E27FC236}">
-                <a16:creationId xmlns:a16="http://schemas.microsoft.com/office/drawing/2014/main" id="{FA61BF0F-529B-E60F-5AFB-9F0A1F98735C}"/>
+          <p:cNvPr id="9" name="Picture 8">
+            <a:extLst>
+              <a:ext uri="{FF2B5EF4-FFF2-40B4-BE49-F238E27FC236}">
+                <a16:creationId xmlns:a16="http://schemas.microsoft.com/office/drawing/2014/main" id="{E5AA8459-3BC6-75C4-8ADC-CF0D8465AB4C}"/>
               </a:ext>
             </a:extLst>
           </p:cNvPr>
@@ -4043,13 +4229,14 @@
         </p:nvPicPr>
         <p:blipFill>
           <a:blip r:embed="rId2"/>
-          <a:srcRect/>
-          <a:stretch/>
+          <a:stretch>
+            <a:fillRect/>
+          </a:stretch>
         </p:blipFill>
         <p:spPr>
           <a:xfrm>
-            <a:off x="9470915" y="241850"/>
-            <a:ext cx="2432984" cy="6374299"/>
+            <a:off x="2124635" y="1488535"/>
+            <a:ext cx="7260291" cy="3943235"/>
           </a:xfrm>
           <a:prstGeom prst="rect">
             <a:avLst/>
@@ -4066,13 +4253,13 @@
   <p:clrMapOvr>
     <a:masterClrMapping/>
   </p:clrMapOvr>
-  <mc:AlternateContent xmlns:mc="http://schemas.openxmlformats.org/markup-compatibility/2006">
-    <mc:Choice xmlns:p14="http://schemas.microsoft.com/office/powerpoint/2010/main" Requires="p14">
+  <mc:AlternateContent xmlns:mc="http://schemas.openxmlformats.org/markup-compatibility/2006" xmlns:p14="http://schemas.microsoft.com/office/powerpoint/2010/main">
+    <mc:Choice Requires="p14">
       <p:transition p14:dur="70">
         <p:fade/>
       </p:transition>
     </mc:Choice>
-    <mc:Fallback>
+    <mc:Fallback xmlns="">
       <p:transition>
         <p:fade/>
       </p:transition>
@@ -4086,7 +4273,13 @@
   <p:cSld>
     <p:spTree>
       <p:nvGrpSpPr>
-        <p:cNvPr id="1" name=""/>
+        <p:cNvPr id="1" name="">
+          <a:extLst>
+            <a:ext uri="{FF2B5EF4-FFF2-40B4-BE49-F238E27FC236}">
+              <a16:creationId xmlns:a16="http://schemas.microsoft.com/office/drawing/2014/main" id="{12AED680-0F94-5DF2-5A78-9D6DC401C1D2}"/>
+            </a:ext>
+          </a:extLst>
+        </p:cNvPr>
         <p:cNvGrpSpPr/>
         <p:nvPr/>
       </p:nvGrpSpPr>
@@ -4100,10 +4293,10 @@
       </p:grpSpPr>
       <p:sp>
         <p:nvSpPr>
-          <p:cNvPr id="4" name="TextBox 3">
-            <a:extLst>
-              <a:ext uri="{FF2B5EF4-FFF2-40B4-BE49-F238E27FC236}">
-                <a16:creationId xmlns:a16="http://schemas.microsoft.com/office/drawing/2014/main" id="{3980149B-46FD-BBB2-A376-078EF2D2DCF8}"/>
+          <p:cNvPr id="7" name="TextBox 6">
+            <a:extLst>
+              <a:ext uri="{FF2B5EF4-FFF2-40B4-BE49-F238E27FC236}">
+                <a16:creationId xmlns:a16="http://schemas.microsoft.com/office/drawing/2014/main" id="{E99E7D82-EB78-FC74-9EE6-EFB29E58A3D9}"/>
               </a:ext>
             </a:extLst>
           </p:cNvPr>
@@ -4112,621 +4305,8 @@
         </p:nvSpPr>
         <p:spPr>
           <a:xfrm>
-            <a:off x="288101" y="292555"/>
-            <a:ext cx="2135059" cy="461665"/>
-          </a:xfrm>
-          <a:prstGeom prst="rect">
-            <a:avLst/>
-          </a:prstGeom>
-          <a:solidFill>
-            <a:schemeClr val="bg1"/>
-          </a:solidFill>
-        </p:spPr>
-        <p:txBody>
-          <a:bodyPr wrap="square" rtlCol="0">
-            <a:spAutoFit/>
-          </a:bodyPr>
-          <a:lstStyle/>
-          <a:p>
-            <a:r>
-              <a:rPr lang="en-US" sz="2400" b="1" dirty="0">
-                <a:latin typeface="Apple Symbols" panose="02000000000000000000" pitchFamily="2" charset="-79"/>
-                <a:ea typeface="Apple Symbols" panose="02000000000000000000" pitchFamily="2" charset="-79"/>
-                <a:cs typeface="Apple Symbols" panose="02000000000000000000" pitchFamily="2" charset="-79"/>
-              </a:rPr>
-              <a:t>Updated Timeline</a:t>
-            </a:r>
-          </a:p>
-        </p:txBody>
-      </p:sp>
-      <p:grpSp>
-        <p:nvGrpSpPr>
-          <p:cNvPr id="26" name="Group 25">
-            <a:extLst>
-              <a:ext uri="{FF2B5EF4-FFF2-40B4-BE49-F238E27FC236}">
-                <a16:creationId xmlns:a16="http://schemas.microsoft.com/office/drawing/2014/main" id="{1340A5EB-95D1-7BEA-0F89-E883A628219B}"/>
-              </a:ext>
-            </a:extLst>
-          </p:cNvPr>
-          <p:cNvGrpSpPr/>
-          <p:nvPr/>
-        </p:nvGrpSpPr>
-        <p:grpSpPr>
-          <a:xfrm>
-            <a:off x="1022732" y="2328092"/>
-            <a:ext cx="10146535" cy="2413900"/>
-            <a:chOff x="1022732" y="3810206"/>
-            <a:chExt cx="10146535" cy="2413900"/>
-          </a:xfrm>
-        </p:grpSpPr>
-        <p:sp>
-          <p:nvSpPr>
-            <p:cNvPr id="5" name="Right Arrow 4">
-              <a:extLst>
-                <a:ext uri="{FF2B5EF4-FFF2-40B4-BE49-F238E27FC236}">
-                  <a16:creationId xmlns:a16="http://schemas.microsoft.com/office/drawing/2014/main" id="{63B9A103-F29C-3F9F-4C1A-46A793A58228}"/>
-                </a:ext>
-              </a:extLst>
-            </p:cNvPr>
-            <p:cNvSpPr/>
-            <p:nvPr/>
-          </p:nvSpPr>
-          <p:spPr>
-            <a:xfrm>
-              <a:off x="1022732" y="4516915"/>
-              <a:ext cx="10146535" cy="1145756"/>
-            </a:xfrm>
-            <a:prstGeom prst="rightArrow">
-              <a:avLst/>
-            </a:prstGeom>
-            <a:blipFill dpi="0" rotWithShape="1">
-              <a:blip r:embed="rId2">
-                <a:extLst>
-                  <a:ext uri="{28A0092B-C50C-407E-A947-70E740481C1C}">
-                    <a14:useLocalDpi xmlns:a14="http://schemas.microsoft.com/office/drawing/2010/main" val="0"/>
-                  </a:ext>
-                </a:extLst>
-              </a:blip>
-              <a:srcRect/>
-              <a:stretch>
-                <a:fillRect/>
-              </a:stretch>
-            </a:blipFill>
-            <a:ln>
-              <a:noFill/>
-            </a:ln>
-          </p:spPr>
-          <p:style>
-            <a:lnRef idx="2">
-              <a:schemeClr val="accent1">
-                <a:shade val="15000"/>
-              </a:schemeClr>
-            </a:lnRef>
-            <a:fillRef idx="1">
-              <a:schemeClr val="accent1"/>
-            </a:fillRef>
-            <a:effectRef idx="0">
-              <a:schemeClr val="accent1"/>
-            </a:effectRef>
-            <a:fontRef idx="minor">
-              <a:schemeClr val="lt1"/>
-            </a:fontRef>
-          </p:style>
-          <p:txBody>
-            <a:bodyPr rtlCol="0" anchor="ctr"/>
-            <a:lstStyle/>
-            <a:p>
-              <a:pPr algn="ctr"/>
-              <a:endParaRPr lang="en-US"/>
-            </a:p>
-          </p:txBody>
-        </p:sp>
-        <p:sp>
-          <p:nvSpPr>
-            <p:cNvPr id="6" name="TextBox 5">
-              <a:extLst>
-                <a:ext uri="{FF2B5EF4-FFF2-40B4-BE49-F238E27FC236}">
-                  <a16:creationId xmlns:a16="http://schemas.microsoft.com/office/drawing/2014/main" id="{D45725A9-6C88-9111-D51B-B8CA8C50EF66}"/>
-                </a:ext>
-              </a:extLst>
-            </p:cNvPr>
-            <p:cNvSpPr txBox="1"/>
-            <p:nvPr/>
-          </p:nvSpPr>
-          <p:spPr>
-            <a:xfrm>
-              <a:off x="1369760" y="3882781"/>
-              <a:ext cx="1778696" cy="646331"/>
-            </a:xfrm>
-            <a:prstGeom prst="rect">
-              <a:avLst/>
-            </a:prstGeom>
-            <a:noFill/>
-          </p:spPr>
-          <p:txBody>
-            <a:bodyPr wrap="square" rtlCol="0">
-              <a:spAutoFit/>
-            </a:bodyPr>
-            <a:lstStyle/>
-            <a:p>
-              <a:pPr algn="ctr"/>
-              <a:r>
-                <a:rPr lang="en-US" b="1" dirty="0">
-                  <a:latin typeface="Apple Symbols" panose="02000000000000000000" pitchFamily="2" charset="-79"/>
-                  <a:ea typeface="Apple Symbols" panose="02000000000000000000" pitchFamily="2" charset="-79"/>
-                  <a:cs typeface="Apple Symbols" panose="02000000000000000000" pitchFamily="2" charset="-79"/>
-                </a:rPr>
-                <a:t>Prototype Circuit Working</a:t>
-              </a:r>
-            </a:p>
-          </p:txBody>
-        </p:sp>
-        <p:sp>
-          <p:nvSpPr>
-            <p:cNvPr id="7" name="TextBox 6">
-              <a:extLst>
-                <a:ext uri="{FF2B5EF4-FFF2-40B4-BE49-F238E27FC236}">
-                  <a16:creationId xmlns:a16="http://schemas.microsoft.com/office/drawing/2014/main" id="{795AC09C-00B1-F0A8-B110-E22495F6AE78}"/>
-                </a:ext>
-              </a:extLst>
-            </p:cNvPr>
-            <p:cNvSpPr txBox="1"/>
-            <p:nvPr/>
-          </p:nvSpPr>
-          <p:spPr>
-            <a:xfrm>
-              <a:off x="5806462" y="3867170"/>
-              <a:ext cx="1778696" cy="923330"/>
-            </a:xfrm>
-            <a:prstGeom prst="rect">
-              <a:avLst/>
-            </a:prstGeom>
-            <a:noFill/>
-          </p:spPr>
-          <p:txBody>
-            <a:bodyPr wrap="square" rtlCol="0">
-              <a:spAutoFit/>
-            </a:bodyPr>
-            <a:lstStyle/>
-            <a:p>
-              <a:pPr algn="ctr"/>
-              <a:r>
-                <a:rPr lang="en-US" b="1" dirty="0">
-                  <a:latin typeface="Apple Symbols" panose="02000000000000000000" pitchFamily="2" charset="-79"/>
-                  <a:ea typeface="Apple Symbols" panose="02000000000000000000" pitchFamily="2" charset="-79"/>
-                  <a:cs typeface="Apple Symbols" panose="02000000000000000000" pitchFamily="2" charset="-79"/>
-                </a:rPr>
-                <a:t>Get the program to work with Teensy and Max</a:t>
-              </a:r>
-            </a:p>
-          </p:txBody>
-        </p:sp>
-        <p:sp>
-          <p:nvSpPr>
-            <p:cNvPr id="8" name="TextBox 7">
-              <a:extLst>
-                <a:ext uri="{FF2B5EF4-FFF2-40B4-BE49-F238E27FC236}">
-                  <a16:creationId xmlns:a16="http://schemas.microsoft.com/office/drawing/2014/main" id="{9A630A9E-9889-ABF1-2A25-1D52151C3841}"/>
-                </a:ext>
-              </a:extLst>
-            </p:cNvPr>
-            <p:cNvSpPr txBox="1"/>
-            <p:nvPr/>
-          </p:nvSpPr>
-          <p:spPr>
-            <a:xfrm>
-              <a:off x="5741427" y="3877923"/>
-              <a:ext cx="1778696" cy="369332"/>
-            </a:xfrm>
-            <a:prstGeom prst="rect">
-              <a:avLst/>
-            </a:prstGeom>
-            <a:noFill/>
-          </p:spPr>
-          <p:txBody>
-            <a:bodyPr wrap="square" rtlCol="0">
-              <a:spAutoFit/>
-            </a:bodyPr>
-            <a:lstStyle/>
-            <a:p>
-              <a:pPr algn="ctr"/>
-              <a:endParaRPr lang="en-US" dirty="0">
-                <a:latin typeface="Apple Symbols" panose="02000000000000000000" pitchFamily="2" charset="-79"/>
-                <a:ea typeface="Apple Symbols" panose="02000000000000000000" pitchFamily="2" charset="-79"/>
-                <a:cs typeface="Apple Symbols" panose="02000000000000000000" pitchFamily="2" charset="-79"/>
-              </a:endParaRPr>
-            </a:p>
-          </p:txBody>
-        </p:sp>
-        <p:sp>
-          <p:nvSpPr>
-            <p:cNvPr id="9" name="TextBox 8">
-              <a:extLst>
-                <a:ext uri="{FF2B5EF4-FFF2-40B4-BE49-F238E27FC236}">
-                  <a16:creationId xmlns:a16="http://schemas.microsoft.com/office/drawing/2014/main" id="{5D27C5E3-FB67-FF03-A229-74C5AE9BC44D}"/>
-                </a:ext>
-              </a:extLst>
-            </p:cNvPr>
-            <p:cNvSpPr txBox="1"/>
-            <p:nvPr/>
-          </p:nvSpPr>
-          <p:spPr>
-            <a:xfrm>
-              <a:off x="7911755" y="3810206"/>
-              <a:ext cx="2001689" cy="923330"/>
-            </a:xfrm>
-            <a:prstGeom prst="rect">
-              <a:avLst/>
-            </a:prstGeom>
-            <a:noFill/>
-          </p:spPr>
-          <p:txBody>
-            <a:bodyPr wrap="square" rtlCol="0">
-              <a:spAutoFit/>
-            </a:bodyPr>
-            <a:lstStyle/>
-            <a:p>
-              <a:pPr algn="ctr"/>
-              <a:r>
-                <a:rPr lang="en-US" b="1" dirty="0">
-                  <a:latin typeface="Apple Symbols" panose="02000000000000000000" pitchFamily="2" charset="-79"/>
-                  <a:ea typeface="Apple Symbols" panose="02000000000000000000" pitchFamily="2" charset="-79"/>
-                  <a:cs typeface="Apple Symbols" panose="02000000000000000000" pitchFamily="2" charset="-79"/>
-                </a:rPr>
-                <a:t>Finish the final assembly, Final Report, Presentation</a:t>
-              </a:r>
-            </a:p>
-          </p:txBody>
-        </p:sp>
-        <p:cxnSp>
-          <p:nvCxnSpPr>
-            <p:cNvPr id="12" name="Straight Connector 11">
-              <a:extLst>
-                <a:ext uri="{FF2B5EF4-FFF2-40B4-BE49-F238E27FC236}">
-                  <a16:creationId xmlns:a16="http://schemas.microsoft.com/office/drawing/2014/main" id="{2AEA6702-07FC-A763-86DF-5D122DDC3058}"/>
-                </a:ext>
-              </a:extLst>
-            </p:cNvPr>
-            <p:cNvCxnSpPr>
-              <a:cxnSpLocks/>
-            </p:cNvCxnSpPr>
-            <p:nvPr/>
-          </p:nvCxnSpPr>
-          <p:spPr>
-            <a:xfrm>
-              <a:off x="4257919" y="4790501"/>
-              <a:ext cx="0" cy="773017"/>
-            </a:xfrm>
-            <a:prstGeom prst="line">
-              <a:avLst/>
-            </a:prstGeom>
-            <a:ln w="19050">
-              <a:solidFill>
-                <a:schemeClr val="tx1"/>
-              </a:solidFill>
-            </a:ln>
-          </p:spPr>
-          <p:style>
-            <a:lnRef idx="2">
-              <a:schemeClr val="accent1"/>
-            </a:lnRef>
-            <a:fillRef idx="0">
-              <a:schemeClr val="accent1"/>
-            </a:fillRef>
-            <a:effectRef idx="1">
-              <a:schemeClr val="accent1"/>
-            </a:effectRef>
-            <a:fontRef idx="minor">
-              <a:schemeClr val="tx1"/>
-            </a:fontRef>
-          </p:style>
-        </p:cxnSp>
-        <p:cxnSp>
-          <p:nvCxnSpPr>
-            <p:cNvPr id="13" name="Straight Connector 12">
-              <a:extLst>
-                <a:ext uri="{FF2B5EF4-FFF2-40B4-BE49-F238E27FC236}">
-                  <a16:creationId xmlns:a16="http://schemas.microsoft.com/office/drawing/2014/main" id="{A9678525-8A63-DD64-C634-06D757C32D2F}"/>
-                </a:ext>
-              </a:extLst>
-            </p:cNvPr>
-            <p:cNvCxnSpPr>
-              <a:cxnSpLocks/>
-            </p:cNvCxnSpPr>
-            <p:nvPr/>
-          </p:nvCxnSpPr>
-          <p:spPr>
-            <a:xfrm>
-              <a:off x="6630775" y="4790500"/>
-              <a:ext cx="0" cy="773018"/>
-            </a:xfrm>
-            <a:prstGeom prst="line">
-              <a:avLst/>
-            </a:prstGeom>
-            <a:ln w="19050">
-              <a:solidFill>
-                <a:schemeClr val="tx1"/>
-              </a:solidFill>
-            </a:ln>
-          </p:spPr>
-          <p:style>
-            <a:lnRef idx="2">
-              <a:schemeClr val="accent1"/>
-            </a:lnRef>
-            <a:fillRef idx="0">
-              <a:schemeClr val="accent1"/>
-            </a:fillRef>
-            <a:effectRef idx="1">
-              <a:schemeClr val="accent1"/>
-            </a:effectRef>
-            <a:fontRef idx="minor">
-              <a:schemeClr val="tx1"/>
-            </a:fontRef>
-          </p:style>
-        </p:cxnSp>
-        <p:cxnSp>
-          <p:nvCxnSpPr>
-            <p:cNvPr id="20" name="Straight Connector 19">
-              <a:extLst>
-                <a:ext uri="{FF2B5EF4-FFF2-40B4-BE49-F238E27FC236}">
-                  <a16:creationId xmlns:a16="http://schemas.microsoft.com/office/drawing/2014/main" id="{BD918EED-6F82-B2FE-F361-B257B1FB6F0D}"/>
-                </a:ext>
-              </a:extLst>
-            </p:cNvPr>
-            <p:cNvCxnSpPr>
-              <a:cxnSpLocks/>
-            </p:cNvCxnSpPr>
-            <p:nvPr/>
-          </p:nvCxnSpPr>
-          <p:spPr>
-            <a:xfrm>
-              <a:off x="8912600" y="4790500"/>
-              <a:ext cx="0" cy="773018"/>
-            </a:xfrm>
-            <a:prstGeom prst="line">
-              <a:avLst/>
-            </a:prstGeom>
-            <a:ln w="19050">
-              <a:solidFill>
-                <a:schemeClr val="tx1"/>
-              </a:solidFill>
-            </a:ln>
-          </p:spPr>
-          <p:style>
-            <a:lnRef idx="2">
-              <a:schemeClr val="accent1"/>
-            </a:lnRef>
-            <a:fillRef idx="0">
-              <a:schemeClr val="accent1"/>
-            </a:fillRef>
-            <a:effectRef idx="1">
-              <a:schemeClr val="accent1"/>
-            </a:effectRef>
-            <a:fontRef idx="minor">
-              <a:schemeClr val="tx1"/>
-            </a:fontRef>
-          </p:style>
-        </p:cxnSp>
-        <p:cxnSp>
-          <p:nvCxnSpPr>
-            <p:cNvPr id="21" name="Straight Connector 20">
-              <a:extLst>
-                <a:ext uri="{FF2B5EF4-FFF2-40B4-BE49-F238E27FC236}">
-                  <a16:creationId xmlns:a16="http://schemas.microsoft.com/office/drawing/2014/main" id="{71D53BD2-3A9E-96C5-853B-36740CD7B164}"/>
-                </a:ext>
-              </a:extLst>
-            </p:cNvPr>
-            <p:cNvCxnSpPr>
-              <a:cxnSpLocks/>
-            </p:cNvCxnSpPr>
-            <p:nvPr/>
-          </p:nvCxnSpPr>
-          <p:spPr>
-            <a:xfrm>
-              <a:off x="2259108" y="4801253"/>
-              <a:ext cx="0" cy="773018"/>
-            </a:xfrm>
-            <a:prstGeom prst="line">
-              <a:avLst/>
-            </a:prstGeom>
-            <a:ln w="19050">
-              <a:solidFill>
-                <a:schemeClr val="tx1"/>
-              </a:solidFill>
-            </a:ln>
-          </p:spPr>
-          <p:style>
-            <a:lnRef idx="2">
-              <a:schemeClr val="accent1"/>
-            </a:lnRef>
-            <a:fillRef idx="0">
-              <a:schemeClr val="accent1"/>
-            </a:fillRef>
-            <a:effectRef idx="1">
-              <a:schemeClr val="accent1"/>
-            </a:effectRef>
-            <a:fontRef idx="minor">
-              <a:schemeClr val="tx1"/>
-            </a:fontRef>
-          </p:style>
-        </p:cxnSp>
-        <p:sp>
-          <p:nvSpPr>
-            <p:cNvPr id="22" name="TextBox 21">
-              <a:extLst>
-                <a:ext uri="{FF2B5EF4-FFF2-40B4-BE49-F238E27FC236}">
-                  <a16:creationId xmlns:a16="http://schemas.microsoft.com/office/drawing/2014/main" id="{4EA4EB97-E9F3-41AE-54AD-B7B23B8A1A81}"/>
-                </a:ext>
-              </a:extLst>
-            </p:cNvPr>
-            <p:cNvSpPr txBox="1"/>
-            <p:nvPr/>
-          </p:nvSpPr>
-          <p:spPr>
-            <a:xfrm>
-              <a:off x="1369760" y="5616504"/>
-              <a:ext cx="1778696" cy="584775"/>
-            </a:xfrm>
-            <a:prstGeom prst="rect">
-              <a:avLst/>
-            </a:prstGeom>
-            <a:noFill/>
-          </p:spPr>
-          <p:txBody>
-            <a:bodyPr wrap="square" rtlCol="0">
-              <a:spAutoFit/>
-            </a:bodyPr>
-            <a:lstStyle/>
-            <a:p>
-              <a:pPr algn="ctr"/>
-              <a:r>
-                <a:rPr lang="en-US" sz="1600" b="1" dirty="0">
-                  <a:latin typeface="Apple Symbols" panose="02000000000000000000" pitchFamily="2" charset="-79"/>
-                  <a:ea typeface="Apple Symbols" panose="02000000000000000000" pitchFamily="2" charset="-79"/>
-                  <a:cs typeface="Apple Symbols" panose="02000000000000000000" pitchFamily="2" charset="-79"/>
-                </a:rPr>
-                <a:t>Done by Reading Break</a:t>
-              </a:r>
-            </a:p>
-          </p:txBody>
-        </p:sp>
-        <p:sp>
-          <p:nvSpPr>
-            <p:cNvPr id="23" name="TextBox 22">
-              <a:extLst>
-                <a:ext uri="{FF2B5EF4-FFF2-40B4-BE49-F238E27FC236}">
-                  <a16:creationId xmlns:a16="http://schemas.microsoft.com/office/drawing/2014/main" id="{8373B89E-5CFA-47E9-E5AD-20150BEA03EF}"/>
-                </a:ext>
-              </a:extLst>
-            </p:cNvPr>
-            <p:cNvSpPr txBox="1"/>
-            <p:nvPr/>
-          </p:nvSpPr>
-          <p:spPr>
-            <a:xfrm>
-              <a:off x="5806462" y="5615991"/>
-              <a:ext cx="1778696" cy="584775"/>
-            </a:xfrm>
-            <a:prstGeom prst="rect">
-              <a:avLst/>
-            </a:prstGeom>
-            <a:noFill/>
-          </p:spPr>
-          <p:txBody>
-            <a:bodyPr wrap="square" rtlCol="0">
-              <a:spAutoFit/>
-            </a:bodyPr>
-            <a:lstStyle/>
-            <a:p>
-              <a:pPr algn="ctr"/>
-              <a:r>
-                <a:rPr lang="en-US" sz="1600" b="1" dirty="0">
-                  <a:latin typeface="Apple Symbols" panose="02000000000000000000" pitchFamily="2" charset="-79"/>
-                  <a:ea typeface="Apple Symbols" panose="02000000000000000000" pitchFamily="2" charset="-79"/>
-                  <a:cs typeface="Apple Symbols" panose="02000000000000000000" pitchFamily="2" charset="-79"/>
-                </a:rPr>
-                <a:t>Done by Mid November</a:t>
-              </a:r>
-            </a:p>
-          </p:txBody>
-        </p:sp>
-        <p:sp>
-          <p:nvSpPr>
-            <p:cNvPr id="24" name="TextBox 23">
-              <a:extLst>
-                <a:ext uri="{FF2B5EF4-FFF2-40B4-BE49-F238E27FC236}">
-                  <a16:creationId xmlns:a16="http://schemas.microsoft.com/office/drawing/2014/main" id="{C70CA9A4-AF20-AD2F-52F3-4F5207CEBE48}"/>
-                </a:ext>
-              </a:extLst>
-            </p:cNvPr>
-            <p:cNvSpPr txBox="1"/>
-            <p:nvPr/>
-          </p:nvSpPr>
-          <p:spPr>
-            <a:xfrm>
-              <a:off x="3368571" y="5639331"/>
-              <a:ext cx="1778696" cy="584775"/>
-            </a:xfrm>
-            <a:prstGeom prst="rect">
-              <a:avLst/>
-            </a:prstGeom>
-            <a:noFill/>
-          </p:spPr>
-          <p:txBody>
-            <a:bodyPr wrap="square" rtlCol="0">
-              <a:spAutoFit/>
-            </a:bodyPr>
-            <a:lstStyle/>
-            <a:p>
-              <a:pPr algn="ctr"/>
-              <a:r>
-                <a:rPr lang="en-US" sz="1600" b="1" dirty="0">
-                  <a:latin typeface="Apple Symbols" panose="02000000000000000000" pitchFamily="2" charset="-79"/>
-                  <a:ea typeface="Apple Symbols" panose="02000000000000000000" pitchFamily="2" charset="-79"/>
-                  <a:cs typeface="Apple Symbols" panose="02000000000000000000" pitchFamily="2" charset="-79"/>
-                </a:rPr>
-                <a:t>Done by Early November</a:t>
-              </a:r>
-            </a:p>
-          </p:txBody>
-        </p:sp>
-        <p:sp>
-          <p:nvSpPr>
-            <p:cNvPr id="25" name="TextBox 24">
-              <a:extLst>
-                <a:ext uri="{FF2B5EF4-FFF2-40B4-BE49-F238E27FC236}">
-                  <a16:creationId xmlns:a16="http://schemas.microsoft.com/office/drawing/2014/main" id="{07205ADC-FF2E-F5B6-4433-0BB5C292C451}"/>
-                </a:ext>
-              </a:extLst>
-            </p:cNvPr>
-            <p:cNvSpPr txBox="1"/>
-            <p:nvPr/>
-          </p:nvSpPr>
-          <p:spPr>
-            <a:xfrm>
-              <a:off x="8023252" y="5615991"/>
-              <a:ext cx="1778696" cy="338554"/>
-            </a:xfrm>
-            <a:prstGeom prst="rect">
-              <a:avLst/>
-            </a:prstGeom>
-            <a:noFill/>
-          </p:spPr>
-          <p:txBody>
-            <a:bodyPr wrap="square" rtlCol="0">
-              <a:spAutoFit/>
-            </a:bodyPr>
-            <a:lstStyle/>
-            <a:p>
-              <a:pPr algn="ctr"/>
-              <a:r>
-                <a:rPr lang="en-US" sz="1600" b="1" dirty="0">
-                  <a:latin typeface="Apple Symbols" panose="02000000000000000000" pitchFamily="2" charset="-79"/>
-                  <a:ea typeface="Apple Symbols" panose="02000000000000000000" pitchFamily="2" charset="-79"/>
-                  <a:cs typeface="Apple Symbols" panose="02000000000000000000" pitchFamily="2" charset="-79"/>
-                </a:rPr>
-                <a:t>By Early December</a:t>
-              </a:r>
-            </a:p>
-          </p:txBody>
-        </p:sp>
-      </p:grpSp>
-      <p:sp>
-        <p:nvSpPr>
-          <p:cNvPr id="3" name="TextBox 2">
-            <a:extLst>
-              <a:ext uri="{FF2B5EF4-FFF2-40B4-BE49-F238E27FC236}">
-                <a16:creationId xmlns:a16="http://schemas.microsoft.com/office/drawing/2014/main" id="{70A0F7ED-C7E7-9625-0CB6-605AAFDA7C4B}"/>
-              </a:ext>
-            </a:extLst>
-          </p:cNvPr>
-          <p:cNvSpPr txBox="1"/>
-          <p:nvPr/>
-        </p:nvSpPr>
-        <p:spPr>
-          <a:xfrm>
-            <a:off x="3414597" y="2400667"/>
-            <a:ext cx="1778696" cy="923330"/>
+            <a:off x="265044" y="205409"/>
+            <a:ext cx="11594928" cy="523220"/>
           </a:xfrm>
           <a:prstGeom prst="rect">
             <a:avLst/>
@@ -4734,27 +4314,75 @@
           <a:noFill/>
         </p:spPr>
         <p:txBody>
-          <a:bodyPr wrap="square" rtlCol="0">
+          <a:bodyPr wrap="square" lIns="90000" rtlCol="0">
             <a:spAutoFit/>
           </a:bodyPr>
           <a:lstStyle/>
           <a:p>
-            <a:pPr algn="ctr"/>
-            <a:r>
-              <a:rPr lang="en-US" b="1" dirty="0">
+            <a:r>
+              <a:rPr lang="en-US" sz="2800" b="1" dirty="0">
                 <a:latin typeface="Apple Symbols" panose="02000000000000000000" pitchFamily="2" charset="-79"/>
                 <a:ea typeface="Apple Symbols" panose="02000000000000000000" pitchFamily="2" charset="-79"/>
                 <a:cs typeface="Apple Symbols" panose="02000000000000000000" pitchFamily="2" charset="-79"/>
               </a:rPr>
-              <a:t>Full circuit connected and implemented</a:t>
-            </a:r>
+              <a:t>Code and Program</a:t>
+            </a:r>
+          </a:p>
+        </p:txBody>
+      </p:sp>
+      <p:sp>
+        <p:nvSpPr>
+          <p:cNvPr id="2" name="Rectangle 1">
+            <a:extLst>
+              <a:ext uri="{FF2B5EF4-FFF2-40B4-BE49-F238E27FC236}">
+                <a16:creationId xmlns:a16="http://schemas.microsoft.com/office/drawing/2014/main" id="{0CF2CFA5-AC17-C915-0707-D6B353833609}"/>
+              </a:ext>
+            </a:extLst>
+          </p:cNvPr>
+          <p:cNvSpPr/>
+          <p:nvPr/>
+        </p:nvSpPr>
+        <p:spPr>
+          <a:xfrm rot="16200000">
+            <a:off x="5361008" y="27007"/>
+            <a:ext cx="1469985" cy="12192001"/>
+          </a:xfrm>
+          <a:prstGeom prst="rect">
+            <a:avLst/>
+          </a:prstGeom>
+          <a:ln>
+            <a:noFill/>
+          </a:ln>
+        </p:spPr>
+        <p:style>
+          <a:lnRef idx="2">
+            <a:schemeClr val="accent1">
+              <a:shade val="15000"/>
+            </a:schemeClr>
+          </a:lnRef>
+          <a:fillRef idx="1">
+            <a:schemeClr val="accent1"/>
+          </a:fillRef>
+          <a:effectRef idx="0">
+            <a:schemeClr val="accent1"/>
+          </a:effectRef>
+          <a:fontRef idx="minor">
+            <a:schemeClr val="lt1"/>
+          </a:fontRef>
+        </p:style>
+        <p:txBody>
+          <a:bodyPr rtlCol="0" anchor="ctr"/>
+          <a:lstStyle/>
+          <a:p>
+            <a:pPr algn="ctr"/>
+            <a:endParaRPr lang="en-US"/>
           </a:p>
         </p:txBody>
       </p:sp>
     </p:spTree>
     <p:extLst>
       <p:ext uri="{BB962C8B-B14F-4D97-AF65-F5344CB8AC3E}">
-        <p14:creationId xmlns:p14="http://schemas.microsoft.com/office/powerpoint/2010/main" val="67413233"/>
+        <p14:creationId xmlns:p14="http://schemas.microsoft.com/office/powerpoint/2010/main" val="3424629978"/>
       </p:ext>
     </p:extLst>
   </p:cSld>
@@ -4781,7 +4409,13 @@
   <p:cSld>
     <p:spTree>
       <p:nvGrpSpPr>
-        <p:cNvPr id="1" name=""/>
+        <p:cNvPr id="1" name="">
+          <a:extLst>
+            <a:ext uri="{FF2B5EF4-FFF2-40B4-BE49-F238E27FC236}">
+              <a16:creationId xmlns:a16="http://schemas.microsoft.com/office/drawing/2014/main" id="{D6B8D9E8-AFEC-B9DD-6677-B4ECBEC8BBA1}"/>
+            </a:ext>
+          </a:extLst>
+        </p:cNvPr>
         <p:cNvGrpSpPr/>
         <p:nvPr/>
       </p:nvGrpSpPr>
@@ -4793,41 +4427,61 @@
           <a:chExt cx="0" cy="0"/>
         </a:xfrm>
       </p:grpSpPr>
-      <p:pic>
-        <p:nvPicPr>
-          <p:cNvPr id="3" name="Picture 2">
-            <a:extLst>
-              <a:ext uri="{FF2B5EF4-FFF2-40B4-BE49-F238E27FC236}">
-                <a16:creationId xmlns:a16="http://schemas.microsoft.com/office/drawing/2014/main" id="{B4A15881-A80F-4966-9BF3-041349567B1A}"/>
-              </a:ext>
-            </a:extLst>
-          </p:cNvPr>
-          <p:cNvPicPr>
-            <a:picLocks noChangeAspect="1"/>
-          </p:cNvPicPr>
+      <p:sp>
+        <p:nvSpPr>
+          <p:cNvPr id="6" name="Rectangle 5">
+            <a:extLst>
+              <a:ext uri="{FF2B5EF4-FFF2-40B4-BE49-F238E27FC236}">
+                <a16:creationId xmlns:a16="http://schemas.microsoft.com/office/drawing/2014/main" id="{0D02A9A3-2A9D-5063-43F3-88F0C99C93C1}"/>
+              </a:ext>
+            </a:extLst>
+          </p:cNvPr>
+          <p:cNvSpPr/>
           <p:nvPr/>
-        </p:nvPicPr>
-        <p:blipFill>
-          <a:blip r:embed="rId2"/>
-          <a:srcRect/>
-          <a:stretch/>
-        </p:blipFill>
+        </p:nvSpPr>
         <p:spPr>
-          <a:xfrm rot="16200000">
-            <a:off x="5136078" y="-2667004"/>
-            <a:ext cx="1919845" cy="12192001"/>
+          <a:xfrm>
+            <a:off x="10722015" y="0"/>
+            <a:ext cx="1469985" cy="6858000"/>
           </a:xfrm>
           <a:prstGeom prst="rect">
             <a:avLst/>
           </a:prstGeom>
+          <a:ln>
+            <a:noFill/>
+          </a:ln>
         </p:spPr>
-      </p:pic>
-      <p:sp>
-        <p:nvSpPr>
-          <p:cNvPr id="6" name="TextBox 5">
-            <a:extLst>
-              <a:ext uri="{FF2B5EF4-FFF2-40B4-BE49-F238E27FC236}">
-                <a16:creationId xmlns:a16="http://schemas.microsoft.com/office/drawing/2014/main" id="{ADE1F4F9-A226-978D-7B91-A7867BDD705B}"/>
+        <p:style>
+          <a:lnRef idx="2">
+            <a:schemeClr val="accent1">
+              <a:shade val="15000"/>
+            </a:schemeClr>
+          </a:lnRef>
+          <a:fillRef idx="1">
+            <a:schemeClr val="accent1"/>
+          </a:fillRef>
+          <a:effectRef idx="0">
+            <a:schemeClr val="accent1"/>
+          </a:effectRef>
+          <a:fontRef idx="minor">
+            <a:schemeClr val="lt1"/>
+          </a:fontRef>
+        </p:style>
+        <p:txBody>
+          <a:bodyPr rtlCol="0" anchor="ctr"/>
+          <a:lstStyle/>
+          <a:p>
+            <a:pPr algn="ctr"/>
+            <a:endParaRPr lang="en-US"/>
+          </a:p>
+        </p:txBody>
+      </p:sp>
+      <p:sp>
+        <p:nvSpPr>
+          <p:cNvPr id="7" name="TextBox 6">
+            <a:extLst>
+              <a:ext uri="{FF2B5EF4-FFF2-40B4-BE49-F238E27FC236}">
+                <a16:creationId xmlns:a16="http://schemas.microsoft.com/office/drawing/2014/main" id="{EBA27D8C-008C-91AF-1931-27DA291435BB}"/>
               </a:ext>
             </a:extLst>
           </p:cNvPr>
@@ -4836,38 +4490,540 @@
         </p:nvSpPr>
         <p:spPr>
           <a:xfrm>
-            <a:off x="4872740" y="3198165"/>
-            <a:ext cx="2446520" cy="461665"/>
+            <a:off x="265044" y="205409"/>
+            <a:ext cx="11594928" cy="523220"/>
           </a:xfrm>
           <a:prstGeom prst="rect">
             <a:avLst/>
           </a:prstGeom>
-          <a:solidFill>
-            <a:schemeClr val="bg1"/>
-          </a:solidFill>
+          <a:noFill/>
         </p:spPr>
         <p:txBody>
-          <a:bodyPr wrap="square" rtlCol="0">
+          <a:bodyPr wrap="square" lIns="90000" rtlCol="0">
             <a:spAutoFit/>
           </a:bodyPr>
           <a:lstStyle/>
           <a:p>
-            <a:pPr algn="ctr"/>
-            <a:r>
-              <a:rPr lang="en-US" sz="2400" b="1" dirty="0">
+            <a:r>
+              <a:rPr lang="en-US" sz="2800" b="1" dirty="0">
                 <a:latin typeface="Apple Symbols" panose="02000000000000000000" pitchFamily="2" charset="-79"/>
                 <a:ea typeface="Apple Symbols" panose="02000000000000000000" pitchFamily="2" charset="-79"/>
                 <a:cs typeface="Apple Symbols" panose="02000000000000000000" pitchFamily="2" charset="-79"/>
               </a:rPr>
-              <a:t>Show and tell</a:t>
-            </a:r>
-          </a:p>
-        </p:txBody>
-      </p:sp>
+              <a:t>Challenges and Solution</a:t>
+            </a:r>
+          </a:p>
+        </p:txBody>
+      </p:sp>
+      <p:graphicFrame>
+        <p:nvGraphicFramePr>
+          <p:cNvPr id="3" name="Table 2">
+            <a:extLst>
+              <a:ext uri="{FF2B5EF4-FFF2-40B4-BE49-F238E27FC236}">
+                <a16:creationId xmlns:a16="http://schemas.microsoft.com/office/drawing/2014/main" id="{A608B127-D9A6-A826-B6E9-4914FAFFE893}"/>
+              </a:ext>
+            </a:extLst>
+          </p:cNvPr>
+          <p:cNvGraphicFramePr>
+            <a:graphicFrameLocks noGrp="1"/>
+          </p:cNvGraphicFramePr>
+          <p:nvPr>
+            <p:extLst>
+              <p:ext uri="{D42A27DB-BD31-4B8C-83A1-F6EECF244321}">
+                <p14:modId xmlns:p14="http://schemas.microsoft.com/office/powerpoint/2010/main" val="3023345317"/>
+              </p:ext>
+            </p:extLst>
+          </p:nvPr>
+        </p:nvGraphicFramePr>
+        <p:xfrm>
+          <a:off x="990698" y="1934674"/>
+          <a:ext cx="8687736" cy="2988652"/>
+        </p:xfrm>
+        <a:graphic>
+          <a:graphicData uri="http://schemas.openxmlformats.org/drawingml/2006/table">
+            <a:tbl>
+              <a:tblPr firstRow="1" bandRow="1">
+                <a:tableStyleId>{5C22544A-7EE6-4342-B048-85BDC9FD1C3A}</a:tableStyleId>
+              </a:tblPr>
+              <a:tblGrid>
+                <a:gridCol w="4343868">
+                  <a:extLst>
+                    <a:ext uri="{9D8B030D-6E8A-4147-A177-3AD203B41FA5}">
+                      <a16:colId xmlns:a16="http://schemas.microsoft.com/office/drawing/2014/main" val="2243186501"/>
+                    </a:ext>
+                  </a:extLst>
+                </a:gridCol>
+                <a:gridCol w="4343868">
+                  <a:extLst>
+                    <a:ext uri="{9D8B030D-6E8A-4147-A177-3AD203B41FA5}">
+                      <a16:colId xmlns:a16="http://schemas.microsoft.com/office/drawing/2014/main" val="1901629735"/>
+                    </a:ext>
+                  </a:extLst>
+                </a:gridCol>
+              </a:tblGrid>
+              <a:tr h="747163">
+                <a:tc>
+                  <a:txBody>
+                    <a:bodyPr/>
+                    <a:lstStyle/>
+                    <a:p>
+                      <a:pPr algn="ctr"/>
+                      <a:r>
+                        <a:rPr lang="en-US" sz="2000" dirty="0">
+                          <a:latin typeface="Apple Symbols" panose="02000000000000000000" pitchFamily="2" charset="-79"/>
+                          <a:ea typeface="Apple Symbols" panose="02000000000000000000" pitchFamily="2" charset="-79"/>
+                          <a:cs typeface="Apple Symbols" panose="02000000000000000000" pitchFamily="2" charset="-79"/>
+                        </a:rPr>
+                        <a:t>Challenges</a:t>
+                      </a:r>
+                    </a:p>
+                  </a:txBody>
+                  <a:tcPr anchor="ctr"/>
+                </a:tc>
+                <a:tc>
+                  <a:txBody>
+                    <a:bodyPr/>
+                    <a:lstStyle/>
+                    <a:p>
+                      <a:pPr marL="0" marR="0" lvl="0" indent="0" algn="ctr" defTabSz="914400" rtl="0" eaLnBrk="1" fontAlgn="auto" latinLnBrk="0" hangingPunct="1">
+                        <a:lnSpc>
+                          <a:spcPct val="100000"/>
+                        </a:lnSpc>
+                        <a:spcBef>
+                          <a:spcPts val="0"/>
+                        </a:spcBef>
+                        <a:spcAft>
+                          <a:spcPts val="0"/>
+                        </a:spcAft>
+                        <a:buClrTx/>
+                        <a:buSzTx/>
+                        <a:buFontTx/>
+                        <a:buNone/>
+                        <a:tabLst/>
+                        <a:defRPr/>
+                      </a:pPr>
+                      <a:r>
+                        <a:rPr lang="en-US" sz="2000" dirty="0">
+                          <a:latin typeface="Apple Symbols" panose="02000000000000000000" pitchFamily="2" charset="-79"/>
+                          <a:ea typeface="Apple Symbols" panose="02000000000000000000" pitchFamily="2" charset="-79"/>
+                          <a:cs typeface="Apple Symbols" panose="02000000000000000000" pitchFamily="2" charset="-79"/>
+                        </a:rPr>
+                        <a:t>Solutions</a:t>
+                      </a:r>
+                    </a:p>
+                  </a:txBody>
+                  <a:tcPr anchor="ctr"/>
+                </a:tc>
+                <a:extLst>
+                  <a:ext uri="{0D108BD9-81ED-4DB2-BD59-A6C34878D82A}">
+                    <a16:rowId xmlns:a16="http://schemas.microsoft.com/office/drawing/2014/main" val="1206634622"/>
+                  </a:ext>
+                </a:extLst>
+              </a:tr>
+              <a:tr h="747163">
+                <a:tc>
+                  <a:txBody>
+                    <a:bodyPr/>
+                    <a:lstStyle/>
+                    <a:p>
+                      <a:r>
+                        <a:rPr lang="en-US" sz="2000" dirty="0">
+                          <a:latin typeface="Apple Symbols" panose="02000000000000000000" pitchFamily="2" charset="-79"/>
+                          <a:ea typeface="Apple Symbols" panose="02000000000000000000" pitchFamily="2" charset="-79"/>
+                          <a:cs typeface="Apple Symbols" panose="02000000000000000000" pitchFamily="2" charset="-79"/>
+                        </a:rPr>
+                        <a:t>Not enough digital pins on the Arduino and refresh rate too low</a:t>
+                      </a:r>
+                    </a:p>
+                  </a:txBody>
+                  <a:tcPr anchor="ctr"/>
+                </a:tc>
+                <a:tc>
+                  <a:txBody>
+                    <a:bodyPr/>
+                    <a:lstStyle/>
+                    <a:p>
+                      <a:r>
+                        <a:rPr lang="en-US" sz="2000" dirty="0">
+                          <a:latin typeface="Apple Symbols" panose="02000000000000000000" pitchFamily="2" charset="-79"/>
+                          <a:ea typeface="Apple Symbols" panose="02000000000000000000" pitchFamily="2" charset="-79"/>
+                          <a:cs typeface="Apple Symbols" panose="02000000000000000000" pitchFamily="2" charset="-79"/>
+                        </a:rPr>
+                        <a:t>Switched to Teensy </a:t>
+                      </a:r>
+                    </a:p>
+                  </a:txBody>
+                  <a:tcPr anchor="ctr"/>
+                </a:tc>
+                <a:extLst>
+                  <a:ext uri="{0D108BD9-81ED-4DB2-BD59-A6C34878D82A}">
+                    <a16:rowId xmlns:a16="http://schemas.microsoft.com/office/drawing/2014/main" val="3155610573"/>
+                  </a:ext>
+                </a:extLst>
+              </a:tr>
+              <a:tr h="747163">
+                <a:tc>
+                  <a:txBody>
+                    <a:bodyPr/>
+                    <a:lstStyle/>
+                    <a:p>
+                      <a:r>
+                        <a:rPr lang="en-US" sz="2000" dirty="0">
+                          <a:latin typeface="Apple Symbols" panose="02000000000000000000" pitchFamily="2" charset="-79"/>
+                          <a:ea typeface="Apple Symbols" panose="02000000000000000000" pitchFamily="2" charset="-79"/>
+                          <a:cs typeface="Apple Symbols" panose="02000000000000000000" pitchFamily="2" charset="-79"/>
+                        </a:rPr>
+                        <a:t>Midi Tempo Control was hard to adjust</a:t>
+                      </a:r>
+                    </a:p>
+                  </a:txBody>
+                  <a:tcPr anchor="ctr"/>
+                </a:tc>
+                <a:tc>
+                  <a:txBody>
+                    <a:bodyPr/>
+                    <a:lstStyle/>
+                    <a:p>
+                      <a:r>
+                        <a:rPr lang="en-US" sz="2000" dirty="0">
+                          <a:latin typeface="Apple Symbols" panose="02000000000000000000" pitchFamily="2" charset="-79"/>
+                          <a:ea typeface="Apple Symbols" panose="02000000000000000000" pitchFamily="2" charset="-79"/>
+                          <a:cs typeface="Apple Symbols" panose="02000000000000000000" pitchFamily="2" charset="-79"/>
+                        </a:rPr>
+                        <a:t>Introduced buffers??</a:t>
+                      </a:r>
+                    </a:p>
+                  </a:txBody>
+                  <a:tcPr anchor="ctr"/>
+                </a:tc>
+                <a:extLst>
+                  <a:ext uri="{0D108BD9-81ED-4DB2-BD59-A6C34878D82A}">
+                    <a16:rowId xmlns:a16="http://schemas.microsoft.com/office/drawing/2014/main" val="940975492"/>
+                  </a:ext>
+                </a:extLst>
+              </a:tr>
+              <a:tr h="747163">
+                <a:tc>
+                  <a:txBody>
+                    <a:bodyPr/>
+                    <a:lstStyle/>
+                    <a:p>
+                      <a:r>
+                        <a:rPr lang="en-US" sz="2000" dirty="0">
+                          <a:latin typeface="Apple Symbols" panose="02000000000000000000" pitchFamily="2" charset="-79"/>
+                          <a:ea typeface="Apple Symbols" panose="02000000000000000000" pitchFamily="2" charset="-79"/>
+                          <a:cs typeface="Apple Symbols" panose="02000000000000000000" pitchFamily="2" charset="-79"/>
+                        </a:rPr>
+                        <a:t>Soldering Issues</a:t>
+                      </a:r>
+                    </a:p>
+                  </a:txBody>
+                  <a:tcPr anchor="ctr"/>
+                </a:tc>
+                <a:tc>
+                  <a:txBody>
+                    <a:bodyPr/>
+                    <a:lstStyle/>
+                    <a:p>
+                      <a:r>
+                        <a:rPr lang="en-US" sz="2000" dirty="0">
+                          <a:latin typeface="Apple Symbols" panose="02000000000000000000" pitchFamily="2" charset="-79"/>
+                          <a:ea typeface="Apple Symbols" panose="02000000000000000000" pitchFamily="2" charset="-79"/>
+                          <a:cs typeface="Apple Symbols" panose="02000000000000000000" pitchFamily="2" charset="-79"/>
+                        </a:rPr>
+                        <a:t>Debugging and resoldering</a:t>
+                      </a:r>
+                    </a:p>
+                  </a:txBody>
+                  <a:tcPr anchor="ctr"/>
+                </a:tc>
+                <a:extLst>
+                  <a:ext uri="{0D108BD9-81ED-4DB2-BD59-A6C34878D82A}">
+                    <a16:rowId xmlns:a16="http://schemas.microsoft.com/office/drawing/2014/main" val="2484464629"/>
+                  </a:ext>
+                </a:extLst>
+              </a:tr>
+            </a:tbl>
+          </a:graphicData>
+        </a:graphic>
+      </p:graphicFrame>
     </p:spTree>
     <p:extLst>
       <p:ext uri="{BB962C8B-B14F-4D97-AF65-F5344CB8AC3E}">
-        <p14:creationId xmlns:p14="http://schemas.microsoft.com/office/powerpoint/2010/main" val="293647527"/>
+        <p14:creationId xmlns:p14="http://schemas.microsoft.com/office/powerpoint/2010/main" val="3933606496"/>
+      </p:ext>
+    </p:extLst>
+  </p:cSld>
+  <p:clrMapOvr>
+    <a:masterClrMapping/>
+  </p:clrMapOvr>
+  <mc:AlternateContent xmlns:mc="http://schemas.openxmlformats.org/markup-compatibility/2006">
+    <mc:Choice xmlns:p14="http://schemas.microsoft.com/office/powerpoint/2010/main" Requires="p14">
+      <p:transition p14:dur="70">
+        <p:fade/>
+      </p:transition>
+    </mc:Choice>
+    <mc:Fallback>
+      <p:transition>
+        <p:fade/>
+      </p:transition>
+    </mc:Fallback>
+  </mc:AlternateContent>
+</p:sld>
+</file>
+
+<file path=ppt/slides/slide6.xml><?xml version="1.0" encoding="utf-8"?>
+<p:sld xmlns:a="http://schemas.openxmlformats.org/drawingml/2006/main" xmlns:r="http://schemas.openxmlformats.org/officeDocument/2006/relationships" xmlns:p="http://schemas.openxmlformats.org/presentationml/2006/main">
+  <p:cSld>
+    <p:spTree>
+      <p:nvGrpSpPr>
+        <p:cNvPr id="1" name="">
+          <a:extLst>
+            <a:ext uri="{FF2B5EF4-FFF2-40B4-BE49-F238E27FC236}">
+              <a16:creationId xmlns:a16="http://schemas.microsoft.com/office/drawing/2014/main" id="{08EE470B-F389-ABF2-0C82-33122216BE01}"/>
+            </a:ext>
+          </a:extLst>
+        </p:cNvPr>
+        <p:cNvGrpSpPr/>
+        <p:nvPr/>
+      </p:nvGrpSpPr>
+      <p:grpSpPr>
+        <a:xfrm>
+          <a:off x="0" y="0"/>
+          <a:ext cx="0" cy="0"/>
+          <a:chOff x="0" y="0"/>
+          <a:chExt cx="0" cy="0"/>
+        </a:xfrm>
+      </p:grpSpPr>
+      <p:sp>
+        <p:nvSpPr>
+          <p:cNvPr id="6" name="Rectangle 5">
+            <a:extLst>
+              <a:ext uri="{FF2B5EF4-FFF2-40B4-BE49-F238E27FC236}">
+                <a16:creationId xmlns:a16="http://schemas.microsoft.com/office/drawing/2014/main" id="{0184BD89-5A13-456B-4557-B772CB943A96}"/>
+              </a:ext>
+            </a:extLst>
+          </p:cNvPr>
+          <p:cNvSpPr/>
+          <p:nvPr/>
+        </p:nvSpPr>
+        <p:spPr>
+          <a:xfrm>
+            <a:off x="0" y="0"/>
+            <a:ext cx="1469985" cy="6858000"/>
+          </a:xfrm>
+          <a:prstGeom prst="rect">
+            <a:avLst/>
+          </a:prstGeom>
+          <a:ln>
+            <a:noFill/>
+          </a:ln>
+        </p:spPr>
+        <p:style>
+          <a:lnRef idx="2">
+            <a:schemeClr val="accent1">
+              <a:shade val="15000"/>
+            </a:schemeClr>
+          </a:lnRef>
+          <a:fillRef idx="1">
+            <a:schemeClr val="accent1"/>
+          </a:fillRef>
+          <a:effectRef idx="0">
+            <a:schemeClr val="accent1"/>
+          </a:effectRef>
+          <a:fontRef idx="minor">
+            <a:schemeClr val="lt1"/>
+          </a:fontRef>
+        </p:style>
+        <p:txBody>
+          <a:bodyPr rtlCol="0" anchor="ctr"/>
+          <a:lstStyle/>
+          <a:p>
+            <a:pPr algn="ctr"/>
+            <a:endParaRPr lang="en-US"/>
+          </a:p>
+        </p:txBody>
+      </p:sp>
+      <p:sp>
+        <p:nvSpPr>
+          <p:cNvPr id="7" name="TextBox 6">
+            <a:extLst>
+              <a:ext uri="{FF2B5EF4-FFF2-40B4-BE49-F238E27FC236}">
+                <a16:creationId xmlns:a16="http://schemas.microsoft.com/office/drawing/2014/main" id="{86FB4FF0-B7B3-31AD-86BD-3F201C84E97E}"/>
+              </a:ext>
+            </a:extLst>
+          </p:cNvPr>
+          <p:cNvSpPr txBox="1"/>
+          <p:nvPr/>
+        </p:nvSpPr>
+        <p:spPr>
+          <a:xfrm>
+            <a:off x="1469985" y="3167390"/>
+            <a:ext cx="10722015" cy="523220"/>
+          </a:xfrm>
+          <a:prstGeom prst="rect">
+            <a:avLst/>
+          </a:prstGeom>
+          <a:noFill/>
+        </p:spPr>
+        <p:txBody>
+          <a:bodyPr wrap="square" lIns="90000" rtlCol="0">
+            <a:spAutoFit/>
+          </a:bodyPr>
+          <a:lstStyle/>
+          <a:p>
+            <a:pPr algn="ctr"/>
+            <a:r>
+              <a:rPr lang="en-US" sz="2800" b="1" dirty="0">
+                <a:latin typeface="Apple Symbols" panose="02000000000000000000" pitchFamily="2" charset="-79"/>
+                <a:ea typeface="Apple Symbols" panose="02000000000000000000" pitchFamily="2" charset="-79"/>
+                <a:cs typeface="Apple Symbols" panose="02000000000000000000" pitchFamily="2" charset="-79"/>
+              </a:rPr>
+              <a:t>Demonstration</a:t>
+            </a:r>
+          </a:p>
+        </p:txBody>
+      </p:sp>
+    </p:spTree>
+    <p:extLst>
+      <p:ext uri="{BB962C8B-B14F-4D97-AF65-F5344CB8AC3E}">
+        <p14:creationId xmlns:p14="http://schemas.microsoft.com/office/powerpoint/2010/main" val="3570218262"/>
+      </p:ext>
+    </p:extLst>
+  </p:cSld>
+  <p:clrMapOvr>
+    <a:masterClrMapping/>
+  </p:clrMapOvr>
+  <mc:AlternateContent xmlns:mc="http://schemas.openxmlformats.org/markup-compatibility/2006">
+    <mc:Choice xmlns:p14="http://schemas.microsoft.com/office/powerpoint/2010/main" Requires="p14">
+      <p:transition p14:dur="70">
+        <p:fade/>
+      </p:transition>
+    </mc:Choice>
+    <mc:Fallback>
+      <p:transition>
+        <p:fade/>
+      </p:transition>
+    </mc:Fallback>
+  </mc:AlternateContent>
+</p:sld>
+</file>
+
+<file path=ppt/slides/slide7.xml><?xml version="1.0" encoding="utf-8"?>
+<p:sld xmlns:a="http://schemas.openxmlformats.org/drawingml/2006/main" xmlns:r="http://schemas.openxmlformats.org/officeDocument/2006/relationships" xmlns:p="http://schemas.openxmlformats.org/presentationml/2006/main">
+  <p:cSld>
+    <p:spTree>
+      <p:nvGrpSpPr>
+        <p:cNvPr id="1" name="">
+          <a:extLst>
+            <a:ext uri="{FF2B5EF4-FFF2-40B4-BE49-F238E27FC236}">
+              <a16:creationId xmlns:a16="http://schemas.microsoft.com/office/drawing/2014/main" id="{3E105ADC-88E3-B542-56F6-B2972FFD4D04}"/>
+            </a:ext>
+          </a:extLst>
+        </p:cNvPr>
+        <p:cNvGrpSpPr/>
+        <p:nvPr/>
+      </p:nvGrpSpPr>
+      <p:grpSpPr>
+        <a:xfrm>
+          <a:off x="0" y="0"/>
+          <a:ext cx="0" cy="0"/>
+          <a:chOff x="0" y="0"/>
+          <a:chExt cx="0" cy="0"/>
+        </a:xfrm>
+      </p:grpSpPr>
+      <p:sp>
+        <p:nvSpPr>
+          <p:cNvPr id="7" name="TextBox 6">
+            <a:extLst>
+              <a:ext uri="{FF2B5EF4-FFF2-40B4-BE49-F238E27FC236}">
+                <a16:creationId xmlns:a16="http://schemas.microsoft.com/office/drawing/2014/main" id="{60C4EA70-D359-29B2-D59B-34E3B180AB4C}"/>
+              </a:ext>
+            </a:extLst>
+          </p:cNvPr>
+          <p:cNvSpPr txBox="1"/>
+          <p:nvPr/>
+        </p:nvSpPr>
+        <p:spPr>
+          <a:xfrm>
+            <a:off x="265044" y="205409"/>
+            <a:ext cx="11594928" cy="523220"/>
+          </a:xfrm>
+          <a:prstGeom prst="rect">
+            <a:avLst/>
+          </a:prstGeom>
+          <a:noFill/>
+        </p:spPr>
+        <p:txBody>
+          <a:bodyPr wrap="square" lIns="90000" rtlCol="0">
+            <a:spAutoFit/>
+          </a:bodyPr>
+          <a:lstStyle/>
+          <a:p>
+            <a:r>
+              <a:rPr lang="en-US" sz="2800" b="1" dirty="0">
+                <a:latin typeface="Apple Symbols" panose="02000000000000000000" pitchFamily="2" charset="-79"/>
+                <a:ea typeface="Apple Symbols" panose="02000000000000000000" pitchFamily="2" charset="-79"/>
+                <a:cs typeface="Apple Symbols" panose="02000000000000000000" pitchFamily="2" charset="-79"/>
+              </a:rPr>
+              <a:t>Future Directions</a:t>
+            </a:r>
+          </a:p>
+        </p:txBody>
+      </p:sp>
+      <p:sp>
+        <p:nvSpPr>
+          <p:cNvPr id="2" name="Rectangle 1">
+            <a:extLst>
+              <a:ext uri="{FF2B5EF4-FFF2-40B4-BE49-F238E27FC236}">
+                <a16:creationId xmlns:a16="http://schemas.microsoft.com/office/drawing/2014/main" id="{23C59CCA-9F68-0714-4CEE-6BE826312143}"/>
+              </a:ext>
+            </a:extLst>
+          </p:cNvPr>
+          <p:cNvSpPr/>
+          <p:nvPr/>
+        </p:nvSpPr>
+        <p:spPr>
+          <a:xfrm rot="16200000">
+            <a:off x="5361008" y="27007"/>
+            <a:ext cx="1469985" cy="12192001"/>
+          </a:xfrm>
+          <a:prstGeom prst="rect">
+            <a:avLst/>
+          </a:prstGeom>
+          <a:ln>
+            <a:noFill/>
+          </a:ln>
+        </p:spPr>
+        <p:style>
+          <a:lnRef idx="2">
+            <a:schemeClr val="accent1">
+              <a:shade val="15000"/>
+            </a:schemeClr>
+          </a:lnRef>
+          <a:fillRef idx="1">
+            <a:schemeClr val="accent1"/>
+          </a:fillRef>
+          <a:effectRef idx="0">
+            <a:schemeClr val="accent1"/>
+          </a:effectRef>
+          <a:fontRef idx="minor">
+            <a:schemeClr val="lt1"/>
+          </a:fontRef>
+        </p:style>
+        <p:txBody>
+          <a:bodyPr rtlCol="0" anchor="ctr"/>
+          <a:lstStyle/>
+          <a:p>
+            <a:pPr algn="ctr"/>
+            <a:endParaRPr lang="en-US"/>
+          </a:p>
+        </p:txBody>
+      </p:sp>
+    </p:spTree>
+    <p:extLst>
+      <p:ext uri="{BB962C8B-B14F-4D97-AF65-F5344CB8AC3E}">
+        <p14:creationId xmlns:p14="http://schemas.microsoft.com/office/powerpoint/2010/main" val="3107697285"/>
       </p:ext>
     </p:extLst>
   </p:cSld>
@@ -5204,6 +5360,321 @@
 </a:theme>
 </file>
 
+<file path=ppt/theme/theme2.xml><?xml version="1.0" encoding="utf-8"?>
+<a:theme xmlns:a="http://schemas.openxmlformats.org/drawingml/2006/main" name="Office Theme">
+  <a:themeElements>
+    <a:clrScheme name="Office">
+      <a:dk1>
+        <a:sysClr val="windowText" lastClr="000000"/>
+      </a:dk1>
+      <a:lt1>
+        <a:sysClr val="window" lastClr="FFFFFF"/>
+      </a:lt1>
+      <a:dk2>
+        <a:srgbClr val="0E2841"/>
+      </a:dk2>
+      <a:lt2>
+        <a:srgbClr val="E8E8E8"/>
+      </a:lt2>
+      <a:accent1>
+        <a:srgbClr val="156082"/>
+      </a:accent1>
+      <a:accent2>
+        <a:srgbClr val="E97132"/>
+      </a:accent2>
+      <a:accent3>
+        <a:srgbClr val="196B24"/>
+      </a:accent3>
+      <a:accent4>
+        <a:srgbClr val="0F9ED5"/>
+      </a:accent4>
+      <a:accent5>
+        <a:srgbClr val="A02B93"/>
+      </a:accent5>
+      <a:accent6>
+        <a:srgbClr val="4EA72E"/>
+      </a:accent6>
+      <a:hlink>
+        <a:srgbClr val="467886"/>
+      </a:hlink>
+      <a:folHlink>
+        <a:srgbClr val="96607D"/>
+      </a:folHlink>
+    </a:clrScheme>
+    <a:fontScheme name="Office">
+      <a:majorFont>
+        <a:latin typeface="Aptos Display" panose="02110004020202020204"/>
+        <a:ea typeface=""/>
+        <a:cs typeface=""/>
+        <a:font script="Jpan" typeface="游ゴシック Light"/>
+        <a:font script="Hang" typeface="맑은 고딕"/>
+        <a:font script="Hans" typeface="等线 Light"/>
+        <a:font script="Hant" typeface="新細明體"/>
+        <a:font script="Arab" typeface="Times New Roman"/>
+        <a:font script="Hebr" typeface="Times New Roman"/>
+        <a:font script="Thai" typeface="Angsana New"/>
+        <a:font script="Ethi" typeface="Nyala"/>
+        <a:font script="Beng" typeface="Vrinda"/>
+        <a:font script="Gujr" typeface="Shruti"/>
+        <a:font script="Khmr" typeface="MoolBoran"/>
+        <a:font script="Knda" typeface="Tunga"/>
+        <a:font script="Guru" typeface="Raavi"/>
+        <a:font script="Cans" typeface="Euphemia"/>
+        <a:font script="Cher" typeface="Plantagenet Cherokee"/>
+        <a:font script="Yiii" typeface="Microsoft Yi Baiti"/>
+        <a:font script="Tibt" typeface="Microsoft Himalaya"/>
+        <a:font script="Thaa" typeface="MV Boli"/>
+        <a:font script="Deva" typeface="Mangal"/>
+        <a:font script="Telu" typeface="Gautami"/>
+        <a:font script="Taml" typeface="Latha"/>
+        <a:font script="Syrc" typeface="Estrangelo Edessa"/>
+        <a:font script="Orya" typeface="Kalinga"/>
+        <a:font script="Mlym" typeface="Kartika"/>
+        <a:font script="Laoo" typeface="DokChampa"/>
+        <a:font script="Sinh" typeface="Iskoola Pota"/>
+        <a:font script="Mong" typeface="Mongolian Baiti"/>
+        <a:font script="Viet" typeface="Times New Roman"/>
+        <a:font script="Uigh" typeface="Microsoft Uighur"/>
+        <a:font script="Geor" typeface="Sylfaen"/>
+        <a:font script="Armn" typeface="Arial"/>
+        <a:font script="Bugi" typeface="Leelawadee UI"/>
+        <a:font script="Bopo" typeface="Microsoft JhengHei"/>
+        <a:font script="Java" typeface="Javanese Text"/>
+        <a:font script="Lisu" typeface="Segoe UI"/>
+        <a:font script="Mymr" typeface="Myanmar Text"/>
+        <a:font script="Nkoo" typeface="Ebrima"/>
+        <a:font script="Olck" typeface="Nirmala UI"/>
+        <a:font script="Osma" typeface="Ebrima"/>
+        <a:font script="Phag" typeface="Phagspa"/>
+        <a:font script="Syrn" typeface="Estrangelo Edessa"/>
+        <a:font script="Syrj" typeface="Estrangelo Edessa"/>
+        <a:font script="Syre" typeface="Estrangelo Edessa"/>
+        <a:font script="Sora" typeface="Nirmala UI"/>
+        <a:font script="Tale" typeface="Microsoft Tai Le"/>
+        <a:font script="Talu" typeface="Microsoft New Tai Lue"/>
+        <a:font script="Tfng" typeface="Ebrima"/>
+      </a:majorFont>
+      <a:minorFont>
+        <a:latin typeface="Aptos" panose="02110004020202020204"/>
+        <a:ea typeface=""/>
+        <a:cs typeface=""/>
+        <a:font script="Jpan" typeface="游ゴシック"/>
+        <a:font script="Hang" typeface="맑은 고딕"/>
+        <a:font script="Hans" typeface="等线"/>
+        <a:font script="Hant" typeface="新細明體"/>
+        <a:font script="Arab" typeface="Arial"/>
+        <a:font script="Hebr" typeface="Arial"/>
+        <a:font script="Thai" typeface="Cordia New"/>
+        <a:font script="Ethi" typeface="Nyala"/>
+        <a:font script="Beng" typeface="Vrinda"/>
+        <a:font script="Gujr" typeface="Shruti"/>
+        <a:font script="Khmr" typeface="DaunPenh"/>
+        <a:font script="Knda" typeface="Tunga"/>
+        <a:font script="Guru" typeface="Raavi"/>
+        <a:font script="Cans" typeface="Euphemia"/>
+        <a:font script="Cher" typeface="Plantagenet Cherokee"/>
+        <a:font script="Yiii" typeface="Microsoft Yi Baiti"/>
+        <a:font script="Tibt" typeface="Microsoft Himalaya"/>
+        <a:font script="Thaa" typeface="MV Boli"/>
+        <a:font script="Deva" typeface="Mangal"/>
+        <a:font script="Telu" typeface="Gautami"/>
+        <a:font script="Taml" typeface="Latha"/>
+        <a:font script="Syrc" typeface="Estrangelo Edessa"/>
+        <a:font script="Orya" typeface="Kalinga"/>
+        <a:font script="Mlym" typeface="Kartika"/>
+        <a:font script="Laoo" typeface="DokChampa"/>
+        <a:font script="Sinh" typeface="Iskoola Pota"/>
+        <a:font script="Mong" typeface="Mongolian Baiti"/>
+        <a:font script="Viet" typeface="Arial"/>
+        <a:font script="Uigh" typeface="Microsoft Uighur"/>
+        <a:font script="Geor" typeface="Sylfaen"/>
+        <a:font script="Armn" typeface="Arial"/>
+        <a:font script="Bugi" typeface="Leelawadee UI"/>
+        <a:font script="Bopo" typeface="Microsoft JhengHei"/>
+        <a:font script="Java" typeface="Javanese Text"/>
+        <a:font script="Lisu" typeface="Segoe UI"/>
+        <a:font script="Mymr" typeface="Myanmar Text"/>
+        <a:font script="Nkoo" typeface="Ebrima"/>
+        <a:font script="Olck" typeface="Nirmala UI"/>
+        <a:font script="Osma" typeface="Ebrima"/>
+        <a:font script="Phag" typeface="Phagspa"/>
+        <a:font script="Syrn" typeface="Estrangelo Edessa"/>
+        <a:font script="Syrj" typeface="Estrangelo Edessa"/>
+        <a:font script="Syre" typeface="Estrangelo Edessa"/>
+        <a:font script="Sora" typeface="Nirmala UI"/>
+        <a:font script="Tale" typeface="Microsoft Tai Le"/>
+        <a:font script="Talu" typeface="Microsoft New Tai Lue"/>
+        <a:font script="Tfng" typeface="Ebrima"/>
+      </a:minorFont>
+    </a:fontScheme>
+    <a:fmtScheme name="Office">
+      <a:fillStyleLst>
+        <a:solidFill>
+          <a:schemeClr val="phClr"/>
+        </a:solidFill>
+        <a:gradFill rotWithShape="1">
+          <a:gsLst>
+            <a:gs pos="0">
+              <a:schemeClr val="phClr">
+                <a:lumMod val="110000"/>
+                <a:satMod val="105000"/>
+                <a:tint val="67000"/>
+              </a:schemeClr>
+            </a:gs>
+            <a:gs pos="50000">
+              <a:schemeClr val="phClr">
+                <a:lumMod val="105000"/>
+                <a:satMod val="103000"/>
+                <a:tint val="73000"/>
+              </a:schemeClr>
+            </a:gs>
+            <a:gs pos="100000">
+              <a:schemeClr val="phClr">
+                <a:lumMod val="105000"/>
+                <a:satMod val="109000"/>
+                <a:tint val="81000"/>
+              </a:schemeClr>
+            </a:gs>
+          </a:gsLst>
+          <a:lin ang="5400000" scaled="0"/>
+        </a:gradFill>
+        <a:gradFill rotWithShape="1">
+          <a:gsLst>
+            <a:gs pos="0">
+              <a:schemeClr val="phClr">
+                <a:satMod val="103000"/>
+                <a:lumMod val="102000"/>
+                <a:tint val="94000"/>
+              </a:schemeClr>
+            </a:gs>
+            <a:gs pos="50000">
+              <a:schemeClr val="phClr">
+                <a:satMod val="110000"/>
+                <a:lumMod val="100000"/>
+                <a:shade val="100000"/>
+              </a:schemeClr>
+            </a:gs>
+            <a:gs pos="100000">
+              <a:schemeClr val="phClr">
+                <a:lumMod val="99000"/>
+                <a:satMod val="120000"/>
+                <a:shade val="78000"/>
+              </a:schemeClr>
+            </a:gs>
+          </a:gsLst>
+          <a:lin ang="5400000" scaled="0"/>
+        </a:gradFill>
+      </a:fillStyleLst>
+      <a:lnStyleLst>
+        <a:ln w="12700" cap="flat" cmpd="sng" algn="ctr">
+          <a:solidFill>
+            <a:schemeClr val="phClr"/>
+          </a:solidFill>
+          <a:prstDash val="solid"/>
+          <a:miter lim="800000"/>
+        </a:ln>
+        <a:ln w="19050" cap="flat" cmpd="sng" algn="ctr">
+          <a:solidFill>
+            <a:schemeClr val="phClr"/>
+          </a:solidFill>
+          <a:prstDash val="solid"/>
+          <a:miter lim="800000"/>
+        </a:ln>
+        <a:ln w="25400" cap="flat" cmpd="sng" algn="ctr">
+          <a:solidFill>
+            <a:schemeClr val="phClr"/>
+          </a:solidFill>
+          <a:prstDash val="solid"/>
+          <a:miter lim="800000"/>
+        </a:ln>
+      </a:lnStyleLst>
+      <a:effectStyleLst>
+        <a:effectStyle>
+          <a:effectLst/>
+        </a:effectStyle>
+        <a:effectStyle>
+          <a:effectLst/>
+        </a:effectStyle>
+        <a:effectStyle>
+          <a:effectLst>
+            <a:outerShdw blurRad="57150" dist="19050" dir="5400000" algn="ctr" rotWithShape="0">
+              <a:srgbClr val="000000">
+                <a:alpha val="63000"/>
+              </a:srgbClr>
+            </a:outerShdw>
+          </a:effectLst>
+        </a:effectStyle>
+      </a:effectStyleLst>
+      <a:bgFillStyleLst>
+        <a:solidFill>
+          <a:schemeClr val="phClr"/>
+        </a:solidFill>
+        <a:solidFill>
+          <a:schemeClr val="phClr">
+            <a:tint val="95000"/>
+            <a:satMod val="170000"/>
+          </a:schemeClr>
+        </a:solidFill>
+        <a:gradFill rotWithShape="1">
+          <a:gsLst>
+            <a:gs pos="0">
+              <a:schemeClr val="phClr">
+                <a:tint val="93000"/>
+                <a:satMod val="150000"/>
+                <a:shade val="98000"/>
+                <a:lumMod val="102000"/>
+              </a:schemeClr>
+            </a:gs>
+            <a:gs pos="50000">
+              <a:schemeClr val="phClr">
+                <a:tint val="98000"/>
+                <a:satMod val="130000"/>
+                <a:shade val="90000"/>
+                <a:lumMod val="103000"/>
+              </a:schemeClr>
+            </a:gs>
+            <a:gs pos="100000">
+              <a:schemeClr val="phClr">
+                <a:shade val="63000"/>
+                <a:satMod val="120000"/>
+              </a:schemeClr>
+            </a:gs>
+          </a:gsLst>
+          <a:lin ang="5400000" scaled="0"/>
+        </a:gradFill>
+      </a:bgFillStyleLst>
+    </a:fmtScheme>
+  </a:themeElements>
+  <a:objectDefaults>
+    <a:lnDef>
+      <a:spPr/>
+      <a:bodyPr/>
+      <a:lstStyle/>
+      <a:style>
+        <a:lnRef idx="2">
+          <a:schemeClr val="accent1"/>
+        </a:lnRef>
+        <a:fillRef idx="0">
+          <a:schemeClr val="accent1"/>
+        </a:fillRef>
+        <a:effectRef idx="1">
+          <a:schemeClr val="accent1"/>
+        </a:effectRef>
+        <a:fontRef idx="minor">
+          <a:schemeClr val="tx1"/>
+        </a:fontRef>
+      </a:style>
+    </a:lnDef>
+  </a:objectDefaults>
+  <a:extraClrSchemeLst/>
+  <a:extLst>
+    <a:ext uri="{05A4C25C-085E-4340-85A3-A5531E510DB2}">
+      <thm15:themeFamily xmlns:thm15="http://schemas.microsoft.com/office/thememl/2012/main" name="Office Theme" id="{2E142A2C-CD16-42D6-873A-C26D2A0506FA}" vid="{1BDDFF52-6CD6-40A5-AB3C-68EB2F1E4D0A}"/>
+    </a:ext>
+  </a:extLst>
+</a:theme>
+</file>
+
 <file path=docMetadata/LabelInfo.xml><?xml version="1.0" encoding="utf-8"?>
 <clbl:labelList xmlns:clbl="http://schemas.microsoft.com/office/2020/mipLabelMetadata">
   <clbl:label id="{cf8d721f-5db2-4de6-92ac-f3310e4c4343}" enabled="1" method="Privileged" siteId="{73d292cb-26a4-4f25-b5df-69a6fad715ca}" contentBits="0" removed="0"/>

</xml_diff>